<commit_message>
Version 2.1n first publish
</commit_message>
<xml_diff>
--- a/SASL-Graphics.pptx
+++ b/SASL-Graphics.pptx
@@ -265,7 +265,7 @@
           <a:p>
             <a:fld id="{C511A6F5-3198-4D4D-AA9B-F769FA488D62}" type="datetimeFigureOut">
               <a:rPr lang="en-US" smtClean="0"/>
-              <a:t>1/8/2019</a:t>
+              <a:t>1/10/2019</a:t>
             </a:fld>
             <a:endParaRPr lang="en-US"/>
           </a:p>
@@ -463,7 +463,7 @@
           <a:p>
             <a:fld id="{C511A6F5-3198-4D4D-AA9B-F769FA488D62}" type="datetimeFigureOut">
               <a:rPr lang="en-US" smtClean="0"/>
-              <a:t>1/8/2019</a:t>
+              <a:t>1/10/2019</a:t>
             </a:fld>
             <a:endParaRPr lang="en-US"/>
           </a:p>
@@ -671,7 +671,7 @@
           <a:p>
             <a:fld id="{C511A6F5-3198-4D4D-AA9B-F769FA488D62}" type="datetimeFigureOut">
               <a:rPr lang="en-US" smtClean="0"/>
-              <a:t>1/8/2019</a:t>
+              <a:t>1/10/2019</a:t>
             </a:fld>
             <a:endParaRPr lang="en-US"/>
           </a:p>
@@ -869,7 +869,7 @@
           <a:p>
             <a:fld id="{C511A6F5-3198-4D4D-AA9B-F769FA488D62}" type="datetimeFigureOut">
               <a:rPr lang="en-US" smtClean="0"/>
-              <a:t>1/8/2019</a:t>
+              <a:t>1/10/2019</a:t>
             </a:fld>
             <a:endParaRPr lang="en-US"/>
           </a:p>
@@ -1144,7 +1144,7 @@
           <a:p>
             <a:fld id="{C511A6F5-3198-4D4D-AA9B-F769FA488D62}" type="datetimeFigureOut">
               <a:rPr lang="en-US" smtClean="0"/>
-              <a:t>1/8/2019</a:t>
+              <a:t>1/10/2019</a:t>
             </a:fld>
             <a:endParaRPr lang="en-US"/>
           </a:p>
@@ -1409,7 +1409,7 @@
           <a:p>
             <a:fld id="{C511A6F5-3198-4D4D-AA9B-F769FA488D62}" type="datetimeFigureOut">
               <a:rPr lang="en-US" smtClean="0"/>
-              <a:t>1/8/2019</a:t>
+              <a:t>1/10/2019</a:t>
             </a:fld>
             <a:endParaRPr lang="en-US"/>
           </a:p>
@@ -1821,7 +1821,7 @@
           <a:p>
             <a:fld id="{C511A6F5-3198-4D4D-AA9B-F769FA488D62}" type="datetimeFigureOut">
               <a:rPr lang="en-US" smtClean="0"/>
-              <a:t>1/8/2019</a:t>
+              <a:t>1/10/2019</a:t>
             </a:fld>
             <a:endParaRPr lang="en-US"/>
           </a:p>
@@ -1962,7 +1962,7 @@
           <a:p>
             <a:fld id="{C511A6F5-3198-4D4D-AA9B-F769FA488D62}" type="datetimeFigureOut">
               <a:rPr lang="en-US" smtClean="0"/>
-              <a:t>1/8/2019</a:t>
+              <a:t>1/10/2019</a:t>
             </a:fld>
             <a:endParaRPr lang="en-US"/>
           </a:p>
@@ -2075,7 +2075,7 @@
           <a:p>
             <a:fld id="{C511A6F5-3198-4D4D-AA9B-F769FA488D62}" type="datetimeFigureOut">
               <a:rPr lang="en-US" smtClean="0"/>
-              <a:t>1/8/2019</a:t>
+              <a:t>1/10/2019</a:t>
             </a:fld>
             <a:endParaRPr lang="en-US"/>
           </a:p>
@@ -2386,7 +2386,7 @@
           <a:p>
             <a:fld id="{C511A6F5-3198-4D4D-AA9B-F769FA488D62}" type="datetimeFigureOut">
               <a:rPr lang="en-US" smtClean="0"/>
-              <a:t>1/8/2019</a:t>
+              <a:t>1/10/2019</a:t>
             </a:fld>
             <a:endParaRPr lang="en-US"/>
           </a:p>
@@ -2674,7 +2674,7 @@
           <a:p>
             <a:fld id="{C511A6F5-3198-4D4D-AA9B-F769FA488D62}" type="datetimeFigureOut">
               <a:rPr lang="en-US" smtClean="0"/>
-              <a:t>1/8/2019</a:t>
+              <a:t>1/10/2019</a:t>
             </a:fld>
             <a:endParaRPr lang="en-US"/>
           </a:p>
@@ -2915,7 +2915,7 @@
           <a:p>
             <a:fld id="{C511A6F5-3198-4D4D-AA9B-F769FA488D62}" type="datetimeFigureOut">
               <a:rPr lang="en-US" smtClean="0"/>
-              <a:t>1/8/2019</a:t>
+              <a:t>1/10/2019</a:t>
             </a:fld>
             <a:endParaRPr lang="en-US"/>
           </a:p>
@@ -6399,7 +6399,7 @@
               <a:t>    </a:t>
             </a:r>
             <a:r>
-              <a:rPr lang="en-US" sz="1200" dirty="0" err="1">
+              <a:rPr lang="en-US" sz="1200" dirty="0">
                 <a:solidFill>
                   <a:srgbClr val="000000"/>
                 </a:solidFill>
@@ -6408,7 +6408,7 @@
               <a:t>G</a:t>
             </a:r>
             <a:r>
-              <a:rPr lang="en-US" sz="1200" b="1" dirty="0" err="1">
+              <a:rPr lang="en-US" sz="1200" b="1" dirty="0">
                 <a:solidFill>
                   <a:srgbClr val="EE9999"/>
                 </a:solidFill>
@@ -6417,7 +6417,7 @@
               <a:t>.</a:t>
             </a:r>
             <a:r>
-              <a:rPr lang="en-US" sz="1200" dirty="0" err="1">
+              <a:rPr lang="en-US" sz="1200" dirty="0">
                 <a:solidFill>
                   <a:srgbClr val="000000"/>
                 </a:solidFill>
@@ -6425,6 +6425,203 @@
               </a:rPr>
               <a:t>GenreID</a:t>
             </a:r>
+          </a:p>
+          <a:p>
+            <a:r>
+              <a:rPr lang="en-US" sz="1200" dirty="0">
+                <a:solidFill>
+                  <a:srgbClr val="000000"/>
+                </a:solidFill>
+                <a:latin typeface="Consolas" panose="020B0609020204030204" pitchFamily="49" charset="0"/>
+              </a:rPr>
+              <a:t>    </a:t>
+            </a:r>
+            <a:r>
+              <a:rPr lang="en-US" sz="1200" b="1" dirty="0">
+                <a:solidFill>
+                  <a:srgbClr val="EE9999"/>
+                </a:solidFill>
+                <a:latin typeface="Consolas" panose="020B0609020204030204" pitchFamily="49" charset="0"/>
+              </a:rPr>
+              <a:t>,</a:t>
+            </a:r>
+            <a:r>
+              <a:rPr lang="en-US" sz="1200" dirty="0">
+                <a:solidFill>
+                  <a:srgbClr val="000000"/>
+                </a:solidFill>
+                <a:latin typeface="Consolas" panose="020B0609020204030204" pitchFamily="49" charset="0"/>
+              </a:rPr>
+              <a:t>G</a:t>
+            </a:r>
+            <a:r>
+              <a:rPr lang="en-US" sz="1200" b="1" dirty="0">
+                <a:solidFill>
+                  <a:srgbClr val="EE9999"/>
+                </a:solidFill>
+                <a:latin typeface="Consolas" panose="020B0609020204030204" pitchFamily="49" charset="0"/>
+              </a:rPr>
+              <a:t>.</a:t>
+            </a:r>
+            <a:r>
+              <a:rPr lang="en-US" sz="1200" dirty="0">
+                <a:solidFill>
+                  <a:srgbClr val="000000"/>
+                </a:solidFill>
+                <a:latin typeface="Consolas" panose="020B0609020204030204" pitchFamily="49" charset="0"/>
+              </a:rPr>
+              <a:t>Name </a:t>
+            </a:r>
+            <a:r>
+              <a:rPr lang="en-US" sz="1200" dirty="0">
+                <a:solidFill>
+                  <a:srgbClr val="0000FF"/>
+                </a:solidFill>
+                <a:latin typeface="Consolas" panose="020B0609020204030204" pitchFamily="49" charset="0"/>
+              </a:rPr>
+              <a:t>as </a:t>
+            </a:r>
+            <a:r>
+              <a:rPr lang="en-US" sz="1200" dirty="0">
+                <a:solidFill>
+                  <a:srgbClr val="000000"/>
+                </a:solidFill>
+                <a:latin typeface="Consolas" panose="020B0609020204030204" pitchFamily="49" charset="0"/>
+              </a:rPr>
+              <a:t>genreName  </a:t>
+            </a:r>
+            <a:r>
+              <a:rPr lang="en-US" sz="1200" dirty="0">
+                <a:solidFill>
+                  <a:srgbClr val="6B8E23"/>
+                </a:solidFill>
+                <a:latin typeface="Consolas" panose="020B0609020204030204" pitchFamily="49" charset="0"/>
+              </a:rPr>
+              <a:t>--&lt;1&gt;    </a:t>
+            </a:r>
+          </a:p>
+          <a:p>
+            <a:r>
+              <a:rPr lang="en-US" sz="1200" dirty="0">
+                <a:solidFill>
+                  <a:srgbClr val="6B8E23"/>
+                </a:solidFill>
+                <a:latin typeface="Consolas" panose="020B0609020204030204" pitchFamily="49" charset="0"/>
+              </a:rPr>
+              <a:t>    </a:t>
+            </a:r>
+            <a:r>
+              <a:rPr lang="en-US" sz="1200" b="1" dirty="0">
+                <a:solidFill>
+                  <a:srgbClr val="EE9999"/>
+                </a:solidFill>
+                <a:latin typeface="Consolas" panose="020B0609020204030204" pitchFamily="49" charset="0"/>
+              </a:rPr>
+              <a:t>,</a:t>
+            </a:r>
+            <a:r>
+              <a:rPr lang="en-US" sz="1200" dirty="0">
+                <a:solidFill>
+                  <a:srgbClr val="0000FF"/>
+                </a:solidFill>
+                <a:latin typeface="Consolas" panose="020B0609020204030204" pitchFamily="49" charset="0"/>
+              </a:rPr>
+              <a:t>count</a:t>
+            </a:r>
+            <a:r>
+              <a:rPr lang="en-US" sz="1200" b="1" dirty="0">
+                <a:solidFill>
+                  <a:srgbClr val="EE9999"/>
+                </a:solidFill>
+                <a:latin typeface="Consolas" panose="020B0609020204030204" pitchFamily="49" charset="0"/>
+              </a:rPr>
+              <a:t>(</a:t>
+            </a:r>
+            <a:r>
+              <a:rPr lang="en-US" sz="1200" dirty="0">
+                <a:solidFill>
+                  <a:srgbClr val="000000"/>
+                </a:solidFill>
+                <a:latin typeface="Consolas" panose="020B0609020204030204" pitchFamily="49" charset="0"/>
+              </a:rPr>
+              <a:t>T</a:t>
+            </a:r>
+            <a:r>
+              <a:rPr lang="en-US" sz="1200" b="1" dirty="0">
+                <a:solidFill>
+                  <a:srgbClr val="EE9999"/>
+                </a:solidFill>
+                <a:latin typeface="Consolas" panose="020B0609020204030204" pitchFamily="49" charset="0"/>
+              </a:rPr>
+              <a:t>.</a:t>
+            </a:r>
+            <a:r>
+              <a:rPr lang="en-US" sz="1200" dirty="0">
+                <a:solidFill>
+                  <a:srgbClr val="000000"/>
+                </a:solidFill>
+                <a:latin typeface="Consolas" panose="020B0609020204030204" pitchFamily="49" charset="0"/>
+              </a:rPr>
+              <a:t>TrackID</a:t>
+            </a:r>
+            <a:r>
+              <a:rPr lang="en-US" sz="1200" b="1" dirty="0">
+                <a:solidFill>
+                  <a:srgbClr val="EE9999"/>
+                </a:solidFill>
+                <a:latin typeface="Consolas" panose="020B0609020204030204" pitchFamily="49" charset="0"/>
+              </a:rPr>
+              <a:t>) </a:t>
+            </a:r>
+            <a:r>
+              <a:rPr lang="en-US" sz="1200" dirty="0">
+                <a:solidFill>
+                  <a:srgbClr val="0000FF"/>
+                </a:solidFill>
+                <a:latin typeface="Consolas" panose="020B0609020204030204" pitchFamily="49" charset="0"/>
+              </a:rPr>
+              <a:t>as </a:t>
+            </a:r>
+            <a:r>
+              <a:rPr lang="en-US" sz="1200" dirty="0">
+                <a:solidFill>
+                  <a:srgbClr val="000000"/>
+                </a:solidFill>
+                <a:latin typeface="Consolas" panose="020B0609020204030204" pitchFamily="49" charset="0"/>
+              </a:rPr>
+              <a:t>numberTracks </a:t>
+            </a:r>
+            <a:r>
+              <a:rPr lang="en-US" sz="1200" dirty="0">
+                <a:solidFill>
+                  <a:srgbClr val="6B8E23"/>
+                </a:solidFill>
+                <a:latin typeface="Consolas" panose="020B0609020204030204" pitchFamily="49" charset="0"/>
+              </a:rPr>
+              <a:t>--&lt;3&gt;</a:t>
+            </a:r>
+          </a:p>
+          <a:p>
+            <a:r>
+              <a:rPr lang="en-US" sz="1200" dirty="0">
+                <a:solidFill>
+                  <a:srgbClr val="0000FF"/>
+                </a:solidFill>
+                <a:latin typeface="Consolas" panose="020B0609020204030204" pitchFamily="49" charset="0"/>
+              </a:rPr>
+              <a:t>from </a:t>
+            </a:r>
+            <a:r>
+              <a:rPr lang="en-US" sz="1200" dirty="0">
+                <a:solidFill>
+                  <a:srgbClr val="000000"/>
+                </a:solidFill>
+                <a:latin typeface="Consolas" panose="020B0609020204030204" pitchFamily="49" charset="0"/>
+              </a:rPr>
+              <a:t>Track T    </a:t>
+            </a:r>
+          </a:p>
+          <a:p>
             <a:endParaRPr lang="en-US" sz="1200" dirty="0">
               <a:solidFill>
                 <a:srgbClr val="000000"/>
@@ -6436,222 +6633,103 @@
             <a:r>
               <a:rPr lang="en-US" sz="1200" dirty="0">
                 <a:solidFill>
+                  <a:srgbClr val="0000FF"/>
+                </a:solidFill>
+                <a:latin typeface="Consolas" panose="020B0609020204030204" pitchFamily="49" charset="0"/>
+              </a:rPr>
+              <a:t>right outer Join </a:t>
+            </a:r>
+            <a:r>
+              <a:rPr lang="en-US" sz="1200" dirty="0">
+                <a:solidFill>
                   <a:srgbClr val="000000"/>
                 </a:solidFill>
                 <a:latin typeface="Consolas" panose="020B0609020204030204" pitchFamily="49" charset="0"/>
               </a:rPr>
-              <a:t>    </a:t>
-            </a:r>
-            <a:r>
-              <a:rPr lang="en-US" sz="1200" b="1" dirty="0">
+              <a:t>Genre G   </a:t>
+            </a:r>
+            <a:r>
+              <a:rPr lang="en-US" sz="1200" dirty="0">
+                <a:solidFill>
+                  <a:srgbClr val="6B8E23"/>
+                </a:solidFill>
+                <a:latin typeface="Consolas" panose="020B0609020204030204" pitchFamily="49" charset="0"/>
+              </a:rPr>
+              <a:t>--&lt;6&gt;</a:t>
+            </a:r>
+          </a:p>
+          <a:p>
+            <a:r>
+              <a:rPr lang="nl-NL" sz="1200" dirty="0">
+                <a:solidFill>
+                  <a:srgbClr val="0000FF"/>
+                </a:solidFill>
+                <a:latin typeface="Consolas" panose="020B0609020204030204" pitchFamily="49" charset="0"/>
+              </a:rPr>
+              <a:t>on </a:t>
+            </a:r>
+            <a:r>
+              <a:rPr lang="nl-NL" sz="1200" dirty="0">
+                <a:solidFill>
+                  <a:srgbClr val="000000"/>
+                </a:solidFill>
+                <a:latin typeface="Consolas" panose="020B0609020204030204" pitchFamily="49" charset="0"/>
+              </a:rPr>
+              <a:t>G</a:t>
+            </a:r>
+            <a:r>
+              <a:rPr lang="nl-NL" sz="1200" b="1" dirty="0">
                 <a:solidFill>
                   <a:srgbClr val="EE9999"/>
                 </a:solidFill>
                 <a:latin typeface="Consolas" panose="020B0609020204030204" pitchFamily="49" charset="0"/>
               </a:rPr>
-              <a:t>,</a:t>
-            </a:r>
-            <a:r>
-              <a:rPr lang="en-US" sz="1200" dirty="0" err="1">
+              <a:t>.</a:t>
+            </a:r>
+            <a:r>
+              <a:rPr lang="nl-NL" sz="1200" dirty="0">
                 <a:solidFill>
                   <a:srgbClr val="000000"/>
                 </a:solidFill>
                 <a:latin typeface="Consolas" panose="020B0609020204030204" pitchFamily="49" charset="0"/>
               </a:rPr>
-              <a:t>G</a:t>
-            </a:r>
-            <a:r>
-              <a:rPr lang="en-US" sz="1200" b="1" dirty="0" err="1">
+              <a:t>GenreID </a:t>
+            </a:r>
+            <a:r>
+              <a:rPr lang="nl-NL" sz="1200" b="1" dirty="0">
                 <a:solidFill>
                   <a:srgbClr val="EE9999"/>
                 </a:solidFill>
                 <a:latin typeface="Consolas" panose="020B0609020204030204" pitchFamily="49" charset="0"/>
               </a:rPr>
+              <a:t>= </a:t>
+            </a:r>
+            <a:r>
+              <a:rPr lang="nl-NL" sz="1200" dirty="0">
+                <a:solidFill>
+                  <a:srgbClr val="000000"/>
+                </a:solidFill>
+                <a:latin typeface="Consolas" panose="020B0609020204030204" pitchFamily="49" charset="0"/>
+              </a:rPr>
+              <a:t>T</a:t>
+            </a:r>
+            <a:r>
+              <a:rPr lang="nl-NL" sz="1200" b="1" dirty="0">
+                <a:solidFill>
+                  <a:srgbClr val="EE9999"/>
+                </a:solidFill>
+                <a:latin typeface="Consolas" panose="020B0609020204030204" pitchFamily="49" charset="0"/>
+              </a:rPr>
               <a:t>.</a:t>
             </a:r>
             <a:r>
-              <a:rPr lang="en-US" sz="1200" dirty="0" err="1">
+              <a:rPr lang="nl-NL" sz="1200" dirty="0">
                 <a:solidFill>
                   <a:srgbClr val="000000"/>
                 </a:solidFill>
                 <a:latin typeface="Consolas" panose="020B0609020204030204" pitchFamily="49" charset="0"/>
               </a:rPr>
-              <a:t>Name</a:t>
-            </a:r>
-            <a:r>
-              <a:rPr lang="en-US" sz="1200" dirty="0">
-                <a:solidFill>
-                  <a:srgbClr val="000000"/>
-                </a:solidFill>
-                <a:latin typeface="Consolas" panose="020B0609020204030204" pitchFamily="49" charset="0"/>
-              </a:rPr>
-              <a:t> </a:t>
-            </a:r>
-            <a:r>
-              <a:rPr lang="en-US" sz="1200" dirty="0">
-                <a:solidFill>
-                  <a:srgbClr val="0000FF"/>
-                </a:solidFill>
-                <a:latin typeface="Consolas" panose="020B0609020204030204" pitchFamily="49" charset="0"/>
-              </a:rPr>
-              <a:t>as </a:t>
-            </a:r>
-            <a:r>
-              <a:rPr lang="en-US" sz="1200" dirty="0" err="1">
-                <a:solidFill>
-                  <a:srgbClr val="000000"/>
-                </a:solidFill>
-                <a:latin typeface="Consolas" panose="020B0609020204030204" pitchFamily="49" charset="0"/>
-              </a:rPr>
-              <a:t>genreName</a:t>
-            </a:r>
-            <a:r>
-              <a:rPr lang="en-US" sz="1200" dirty="0">
-                <a:solidFill>
-                  <a:srgbClr val="000000"/>
-                </a:solidFill>
-                <a:latin typeface="Consolas" panose="020B0609020204030204" pitchFamily="49" charset="0"/>
-              </a:rPr>
-              <a:t>  </a:t>
-            </a:r>
-            <a:r>
-              <a:rPr lang="en-US" sz="1200" dirty="0">
-                <a:solidFill>
-                  <a:srgbClr val="6B8E23"/>
-                </a:solidFill>
-                <a:latin typeface="Consolas" panose="020B0609020204030204" pitchFamily="49" charset="0"/>
-              </a:rPr>
-              <a:t>--&lt;1&gt;    </a:t>
-            </a:r>
-          </a:p>
-          <a:p>
-            <a:r>
-              <a:rPr lang="en-US" sz="1200" dirty="0">
-                <a:solidFill>
-                  <a:srgbClr val="6B8E23"/>
-                </a:solidFill>
-                <a:latin typeface="Consolas" panose="020B0609020204030204" pitchFamily="49" charset="0"/>
-              </a:rPr>
-              <a:t>    </a:t>
-            </a:r>
-            <a:r>
-              <a:rPr lang="en-US" sz="1200" b="1" dirty="0">
-                <a:solidFill>
-                  <a:srgbClr val="EE9999"/>
-                </a:solidFill>
-                <a:latin typeface="Consolas" panose="020B0609020204030204" pitchFamily="49" charset="0"/>
-              </a:rPr>
-              <a:t>,</a:t>
-            </a:r>
-            <a:r>
-              <a:rPr lang="en-US" sz="1200" dirty="0">
-                <a:solidFill>
-                  <a:srgbClr val="0000FF"/>
-                </a:solidFill>
-                <a:latin typeface="Consolas" panose="020B0609020204030204" pitchFamily="49" charset="0"/>
-              </a:rPr>
-              <a:t>count</a:t>
-            </a:r>
-            <a:r>
-              <a:rPr lang="en-US" sz="1200" b="1" dirty="0">
-                <a:solidFill>
-                  <a:srgbClr val="EE9999"/>
-                </a:solidFill>
-                <a:latin typeface="Consolas" panose="020B0609020204030204" pitchFamily="49" charset="0"/>
-              </a:rPr>
-              <a:t>(</a:t>
-            </a:r>
-            <a:r>
-              <a:rPr lang="en-US" sz="1200" dirty="0" err="1">
-                <a:solidFill>
-                  <a:srgbClr val="000000"/>
-                </a:solidFill>
-                <a:latin typeface="Consolas" panose="020B0609020204030204" pitchFamily="49" charset="0"/>
-              </a:rPr>
-              <a:t>T</a:t>
-            </a:r>
-            <a:r>
-              <a:rPr lang="en-US" sz="1200" b="1" dirty="0" err="1">
-                <a:solidFill>
-                  <a:srgbClr val="EE9999"/>
-                </a:solidFill>
-                <a:latin typeface="Consolas" panose="020B0609020204030204" pitchFamily="49" charset="0"/>
-              </a:rPr>
-              <a:t>.</a:t>
-            </a:r>
-            <a:r>
-              <a:rPr lang="en-US" sz="1200" dirty="0" err="1">
-                <a:solidFill>
-                  <a:srgbClr val="000000"/>
-                </a:solidFill>
-                <a:latin typeface="Consolas" panose="020B0609020204030204" pitchFamily="49" charset="0"/>
-              </a:rPr>
-              <a:t>TrackID</a:t>
-            </a:r>
-            <a:r>
-              <a:rPr lang="en-US" sz="1200" b="1" dirty="0">
-                <a:solidFill>
-                  <a:srgbClr val="EE9999"/>
-                </a:solidFill>
-                <a:latin typeface="Consolas" panose="020B0609020204030204" pitchFamily="49" charset="0"/>
-              </a:rPr>
-              <a:t>) </a:t>
-            </a:r>
-            <a:r>
-              <a:rPr lang="en-US" sz="1200" dirty="0">
-                <a:solidFill>
-                  <a:srgbClr val="0000FF"/>
-                </a:solidFill>
-                <a:latin typeface="Consolas" panose="020B0609020204030204" pitchFamily="49" charset="0"/>
-              </a:rPr>
-              <a:t>as </a:t>
-            </a:r>
-            <a:r>
-              <a:rPr lang="en-US" sz="1200" dirty="0" err="1">
-                <a:solidFill>
-                  <a:srgbClr val="000000"/>
-                </a:solidFill>
-                <a:latin typeface="Consolas" panose="020B0609020204030204" pitchFamily="49" charset="0"/>
-              </a:rPr>
-              <a:t>numberTracks</a:t>
-            </a:r>
-            <a:r>
-              <a:rPr lang="en-US" sz="1200" dirty="0">
-                <a:solidFill>
-                  <a:srgbClr val="000000"/>
-                </a:solidFill>
-                <a:latin typeface="Consolas" panose="020B0609020204030204" pitchFamily="49" charset="0"/>
-              </a:rPr>
-              <a:t> </a:t>
-            </a:r>
-            <a:r>
-              <a:rPr lang="en-US" sz="1200" dirty="0">
-                <a:solidFill>
-                  <a:srgbClr val="6B8E23"/>
-                </a:solidFill>
-                <a:latin typeface="Consolas" panose="020B0609020204030204" pitchFamily="49" charset="0"/>
-              </a:rPr>
-              <a:t>--&lt;3&gt;</a:t>
-            </a:r>
-          </a:p>
-          <a:p>
-            <a:r>
-              <a:rPr lang="en-US" sz="1200" dirty="0">
-                <a:solidFill>
-                  <a:srgbClr val="0000FF"/>
-                </a:solidFill>
-                <a:latin typeface="Consolas" panose="020B0609020204030204" pitchFamily="49" charset="0"/>
-              </a:rPr>
-              <a:t>from </a:t>
-            </a:r>
-            <a:r>
-              <a:rPr lang="en-US" sz="1200" dirty="0">
-                <a:solidFill>
-                  <a:srgbClr val="000000"/>
-                </a:solidFill>
-                <a:latin typeface="Consolas" panose="020B0609020204030204" pitchFamily="49" charset="0"/>
-              </a:rPr>
-              <a:t>Track T    </a:t>
+              <a:t>GenreID</a:t>
             </a:r>
           </a:p>
           <a:p>
@@ -6670,7 +6748,18 @@
                 </a:solidFill>
                 <a:latin typeface="Consolas" panose="020B0609020204030204" pitchFamily="49" charset="0"/>
               </a:rPr>
-              <a:t>right outer Join </a:t>
+              <a:t>Group by</a:t>
+            </a:r>
+          </a:p>
+          <a:p>
+            <a:r>
+              <a:rPr lang="en-US" sz="1200" dirty="0">
+                <a:solidFill>
+                  <a:srgbClr val="0000FF"/>
+                </a:solidFill>
+                <a:latin typeface="Consolas" panose="020B0609020204030204" pitchFamily="49" charset="0"/>
+              </a:rPr>
+              <a:t>	</a:t>
             </a:r>
             <a:r>
               <a:rPr lang="en-US" sz="1200" dirty="0">
@@ -6679,7 +6768,54 @@
                 </a:solidFill>
                 <a:latin typeface="Consolas" panose="020B0609020204030204" pitchFamily="49" charset="0"/>
               </a:rPr>
-              <a:t>Genre G   </a:t>
+              <a:t>G</a:t>
+            </a:r>
+            <a:r>
+              <a:rPr lang="en-US" sz="1200" b="1" dirty="0">
+                <a:solidFill>
+                  <a:srgbClr val="EE9999"/>
+                </a:solidFill>
+                <a:latin typeface="Consolas" panose="020B0609020204030204" pitchFamily="49" charset="0"/>
+              </a:rPr>
+              <a:t>.</a:t>
+            </a:r>
+            <a:r>
+              <a:rPr lang="en-US" sz="1200" dirty="0">
+                <a:solidFill>
+                  <a:srgbClr val="000000"/>
+                </a:solidFill>
+                <a:latin typeface="Consolas" panose="020B0609020204030204" pitchFamily="49" charset="0"/>
+              </a:rPr>
+              <a:t>GenreID</a:t>
+            </a:r>
+          </a:p>
+          <a:p>
+            <a:r>
+              <a:rPr lang="en-US" sz="1200" dirty="0">
+                <a:solidFill>
+                  <a:srgbClr val="000000"/>
+                </a:solidFill>
+                <a:latin typeface="Consolas" panose="020B0609020204030204" pitchFamily="49" charset="0"/>
+              </a:rPr>
+              <a:t>	</a:t>
+            </a:r>
+            <a:r>
+              <a:rPr lang="en-US" sz="1200" b="1" dirty="0">
+                <a:solidFill>
+                  <a:srgbClr val="EE9999"/>
+                </a:solidFill>
+                <a:latin typeface="Consolas" panose="020B0609020204030204" pitchFamily="49" charset="0"/>
+              </a:rPr>
+              <a:t>,</a:t>
+            </a:r>
+            <a:r>
+              <a:rPr lang="en-US" sz="1200" dirty="0">
+                <a:solidFill>
+                  <a:srgbClr val="000000"/>
+                </a:solidFill>
+                <a:latin typeface="Consolas" panose="020B0609020204030204" pitchFamily="49" charset="0"/>
+              </a:rPr>
+              <a:t>genreName   </a:t>
             </a:r>
             <a:r>
               <a:rPr lang="en-US" sz="1200" dirty="0">
@@ -6688,90 +6824,19 @@
                 </a:solidFill>
                 <a:latin typeface="Consolas" panose="020B0609020204030204" pitchFamily="49" charset="0"/>
               </a:rPr>
-              <a:t>--&lt;6&gt;</a:t>
-            </a:r>
-          </a:p>
-          <a:p>
-            <a:r>
-              <a:rPr lang="nl-NL" sz="1200" dirty="0">
+              <a:t>--&lt;5&gt;</a:t>
+            </a:r>
+          </a:p>
+          <a:p>
+            <a:r>
+              <a:rPr lang="en-US" sz="1200" dirty="0">
                 <a:solidFill>
                   <a:srgbClr val="0000FF"/>
                 </a:solidFill>
                 <a:latin typeface="Consolas" panose="020B0609020204030204" pitchFamily="49" charset="0"/>
               </a:rPr>
-              <a:t>on </a:t>
-            </a:r>
-            <a:r>
-              <a:rPr lang="nl-NL" sz="1200" dirty="0">
-                <a:solidFill>
-                  <a:srgbClr val="000000"/>
-                </a:solidFill>
-                <a:latin typeface="Consolas" panose="020B0609020204030204" pitchFamily="49" charset="0"/>
-              </a:rPr>
-              <a:t>G</a:t>
-            </a:r>
-            <a:r>
-              <a:rPr lang="nl-NL" sz="1200" b="1" dirty="0">
-                <a:solidFill>
-                  <a:srgbClr val="EE9999"/>
-                </a:solidFill>
-                <a:latin typeface="Consolas" panose="020B0609020204030204" pitchFamily="49" charset="0"/>
-              </a:rPr>
-              <a:t>.</a:t>
-            </a:r>
-            <a:r>
-              <a:rPr lang="nl-NL" sz="1200" dirty="0">
-                <a:solidFill>
-                  <a:srgbClr val="000000"/>
-                </a:solidFill>
-                <a:latin typeface="Consolas" panose="020B0609020204030204" pitchFamily="49" charset="0"/>
-              </a:rPr>
-              <a:t>GenreID </a:t>
-            </a:r>
-            <a:r>
-              <a:rPr lang="nl-NL" sz="1200" b="1" dirty="0">
-                <a:solidFill>
-                  <a:srgbClr val="EE9999"/>
-                </a:solidFill>
-                <a:latin typeface="Consolas" panose="020B0609020204030204" pitchFamily="49" charset="0"/>
-              </a:rPr>
-              <a:t>= </a:t>
-            </a:r>
-            <a:r>
-              <a:rPr lang="nl-NL" sz="1200" dirty="0">
-                <a:solidFill>
-                  <a:srgbClr val="000000"/>
-                </a:solidFill>
-                <a:latin typeface="Consolas" panose="020B0609020204030204" pitchFamily="49" charset="0"/>
-              </a:rPr>
-              <a:t>T</a:t>
-            </a:r>
-            <a:r>
-              <a:rPr lang="nl-NL" sz="1200" b="1" dirty="0">
-                <a:solidFill>
-                  <a:srgbClr val="EE9999"/>
-                </a:solidFill>
-                <a:latin typeface="Consolas" panose="020B0609020204030204" pitchFamily="49" charset="0"/>
-              </a:rPr>
-              <a:t>.</a:t>
-            </a:r>
-            <a:r>
-              <a:rPr lang="nl-NL" sz="1200" dirty="0">
-                <a:solidFill>
-                  <a:srgbClr val="000000"/>
-                </a:solidFill>
-                <a:latin typeface="Consolas" panose="020B0609020204030204" pitchFamily="49" charset="0"/>
-              </a:rPr>
-              <a:t>GenreID</a:t>
-            </a:r>
-          </a:p>
-          <a:p>
-            <a:endParaRPr lang="en-US" sz="1200" dirty="0">
-              <a:solidFill>
-                <a:srgbClr val="000000"/>
-              </a:solidFill>
-              <a:latin typeface="Consolas" panose="020B0609020204030204" pitchFamily="49" charset="0"/>
-            </a:endParaRPr>
+              <a:t>order by </a:t>
+            </a:r>
           </a:p>
           <a:p>
             <a:r>
@@ -6781,123 +6846,10 @@
                 </a:solidFill>
                 <a:latin typeface="Consolas" panose="020B0609020204030204" pitchFamily="49" charset="0"/>
               </a:rPr>
-              <a:t>Group by</a:t>
-            </a:r>
-          </a:p>
-          <a:p>
-            <a:r>
-              <a:rPr lang="en-US" sz="1200" dirty="0">
-                <a:solidFill>
-                  <a:srgbClr val="0000FF"/>
-                </a:solidFill>
-                <a:latin typeface="Consolas" panose="020B0609020204030204" pitchFamily="49" charset="0"/>
-              </a:rPr>
               <a:t>	</a:t>
             </a:r>
             <a:r>
-              <a:rPr lang="en-US" sz="1200" dirty="0" err="1">
-                <a:solidFill>
-                  <a:srgbClr val="000000"/>
-                </a:solidFill>
-                <a:latin typeface="Consolas" panose="020B0609020204030204" pitchFamily="49" charset="0"/>
-              </a:rPr>
-              <a:t>G</a:t>
-            </a:r>
-            <a:r>
-              <a:rPr lang="en-US" sz="1200" b="1" dirty="0" err="1">
-                <a:solidFill>
-                  <a:srgbClr val="EE9999"/>
-                </a:solidFill>
-                <a:latin typeface="Consolas" panose="020B0609020204030204" pitchFamily="49" charset="0"/>
-              </a:rPr>
-              <a:t>.</a:t>
-            </a:r>
-            <a:r>
-              <a:rPr lang="en-US" sz="1200" dirty="0" err="1">
-                <a:solidFill>
-                  <a:srgbClr val="000000"/>
-                </a:solidFill>
-                <a:latin typeface="Consolas" panose="020B0609020204030204" pitchFamily="49" charset="0"/>
-              </a:rPr>
-              <a:t>GenreID</a:t>
-            </a:r>
-            <a:endParaRPr lang="en-US" sz="1200" dirty="0">
-              <a:solidFill>
-                <a:srgbClr val="000000"/>
-              </a:solidFill>
-              <a:latin typeface="Consolas" panose="020B0609020204030204" pitchFamily="49" charset="0"/>
-            </a:endParaRPr>
-          </a:p>
-          <a:p>
-            <a:r>
-              <a:rPr lang="en-US" sz="1200" dirty="0">
-                <a:solidFill>
-                  <a:srgbClr val="000000"/>
-                </a:solidFill>
-                <a:latin typeface="Consolas" panose="020B0609020204030204" pitchFamily="49" charset="0"/>
-              </a:rPr>
-              <a:t>	</a:t>
-            </a:r>
-            <a:r>
-              <a:rPr lang="en-US" sz="1200" b="1" dirty="0">
-                <a:solidFill>
-                  <a:srgbClr val="EE9999"/>
-                </a:solidFill>
-                <a:latin typeface="Consolas" panose="020B0609020204030204" pitchFamily="49" charset="0"/>
-              </a:rPr>
-              <a:t>,</a:t>
-            </a:r>
-            <a:r>
-              <a:rPr lang="en-US" sz="1200" dirty="0" err="1">
-                <a:solidFill>
-                  <a:srgbClr val="000000"/>
-                </a:solidFill>
-                <a:latin typeface="Consolas" panose="020B0609020204030204" pitchFamily="49" charset="0"/>
-              </a:rPr>
-              <a:t>genreName</a:t>
-            </a:r>
-            <a:r>
-              <a:rPr lang="en-US" sz="1200" dirty="0">
-                <a:solidFill>
-                  <a:srgbClr val="000000"/>
-                </a:solidFill>
-                <a:latin typeface="Consolas" panose="020B0609020204030204" pitchFamily="49" charset="0"/>
-              </a:rPr>
-              <a:t>   </a:t>
-            </a:r>
-            <a:r>
-              <a:rPr lang="en-US" sz="1200" dirty="0">
-                <a:solidFill>
-                  <a:srgbClr val="6B8E23"/>
-                </a:solidFill>
-                <a:latin typeface="Consolas" panose="020B0609020204030204" pitchFamily="49" charset="0"/>
-              </a:rPr>
-              <a:t>--&lt;5&gt;</a:t>
-            </a:r>
-          </a:p>
-          <a:p>
-            <a:r>
-              <a:rPr lang="en-US" sz="1200" dirty="0">
-                <a:solidFill>
-                  <a:srgbClr val="0000FF"/>
-                </a:solidFill>
-                <a:latin typeface="Consolas" panose="020B0609020204030204" pitchFamily="49" charset="0"/>
-              </a:rPr>
-              <a:t>order by </a:t>
-            </a:r>
-          </a:p>
-          <a:p>
-            <a:r>
-              <a:rPr lang="en-US" sz="1200" dirty="0">
-                <a:solidFill>
-                  <a:srgbClr val="0000FF"/>
-                </a:solidFill>
-                <a:latin typeface="Consolas" panose="020B0609020204030204" pitchFamily="49" charset="0"/>
-              </a:rPr>
-              <a:t>	</a:t>
-            </a:r>
-            <a:r>
-              <a:rPr lang="en-US" sz="1200" dirty="0" err="1">
+              <a:rPr lang="en-US" sz="1200" dirty="0">
                 <a:solidFill>
                   <a:srgbClr val="000000"/>
                 </a:solidFill>
@@ -7088,7 +7040,7 @@
               <a:t>    </a:t>
             </a:r>
             <a:r>
-              <a:rPr lang="en-US" sz="1200" dirty="0" err="1">
+              <a:rPr lang="en-US" sz="1200" dirty="0">
                 <a:solidFill>
                   <a:srgbClr val="000000"/>
                 </a:solidFill>
@@ -7097,7 +7049,7 @@
               <a:t>G</a:t>
             </a:r>
             <a:r>
-              <a:rPr lang="en-US" sz="1200" b="1" dirty="0" err="1">
+              <a:rPr lang="en-US" sz="1200" b="1" dirty="0">
                 <a:solidFill>
                   <a:srgbClr val="EE9999"/>
                 </a:solidFill>
@@ -7106,7 +7058,7 @@
               <a:t>.</a:t>
             </a:r>
             <a:r>
-              <a:rPr lang="en-US" sz="1200" dirty="0" err="1">
+              <a:rPr lang="en-US" sz="1200" dirty="0">
                 <a:solidFill>
                   <a:srgbClr val="000000"/>
                 </a:solidFill>
@@ -7114,6 +7066,203 @@
               </a:rPr>
               <a:t>GenreID</a:t>
             </a:r>
+          </a:p>
+          <a:p>
+            <a:r>
+              <a:rPr lang="en-US" sz="1200" dirty="0">
+                <a:solidFill>
+                  <a:srgbClr val="000000"/>
+                </a:solidFill>
+                <a:latin typeface="Consolas" panose="020B0609020204030204" pitchFamily="49" charset="0"/>
+              </a:rPr>
+              <a:t>    </a:t>
+            </a:r>
+            <a:r>
+              <a:rPr lang="en-US" sz="1200" b="1" dirty="0">
+                <a:solidFill>
+                  <a:srgbClr val="EE9999"/>
+                </a:solidFill>
+                <a:latin typeface="Consolas" panose="020B0609020204030204" pitchFamily="49" charset="0"/>
+              </a:rPr>
+              <a:t>,</a:t>
+            </a:r>
+            <a:r>
+              <a:rPr lang="en-US" sz="1200" dirty="0">
+                <a:solidFill>
+                  <a:srgbClr val="000000"/>
+                </a:solidFill>
+                <a:latin typeface="Consolas" panose="020B0609020204030204" pitchFamily="49" charset="0"/>
+              </a:rPr>
+              <a:t>G</a:t>
+            </a:r>
+            <a:r>
+              <a:rPr lang="en-US" sz="1200" b="1" dirty="0">
+                <a:solidFill>
+                  <a:srgbClr val="EE9999"/>
+                </a:solidFill>
+                <a:latin typeface="Consolas" panose="020B0609020204030204" pitchFamily="49" charset="0"/>
+              </a:rPr>
+              <a:t>.</a:t>
+            </a:r>
+            <a:r>
+              <a:rPr lang="en-US" sz="1200" dirty="0">
+                <a:solidFill>
+                  <a:srgbClr val="000000"/>
+                </a:solidFill>
+                <a:latin typeface="Consolas" panose="020B0609020204030204" pitchFamily="49" charset="0"/>
+              </a:rPr>
+              <a:t>Name </a:t>
+            </a:r>
+            <a:r>
+              <a:rPr lang="en-US" sz="1200" dirty="0">
+                <a:solidFill>
+                  <a:srgbClr val="0000FF"/>
+                </a:solidFill>
+                <a:latin typeface="Consolas" panose="020B0609020204030204" pitchFamily="49" charset="0"/>
+              </a:rPr>
+              <a:t>as </a:t>
+            </a:r>
+            <a:r>
+              <a:rPr lang="en-US" sz="1200" dirty="0">
+                <a:solidFill>
+                  <a:srgbClr val="000000"/>
+                </a:solidFill>
+                <a:latin typeface="Consolas" panose="020B0609020204030204" pitchFamily="49" charset="0"/>
+              </a:rPr>
+              <a:t>genreName  </a:t>
+            </a:r>
+            <a:r>
+              <a:rPr lang="en-US" sz="1200" dirty="0">
+                <a:solidFill>
+                  <a:srgbClr val="6B8E23"/>
+                </a:solidFill>
+                <a:latin typeface="Consolas" panose="020B0609020204030204" pitchFamily="49" charset="0"/>
+              </a:rPr>
+              <a:t>--&lt;1&gt;    </a:t>
+            </a:r>
+          </a:p>
+          <a:p>
+            <a:r>
+              <a:rPr lang="en-US" sz="1200" dirty="0">
+                <a:solidFill>
+                  <a:srgbClr val="6B8E23"/>
+                </a:solidFill>
+                <a:latin typeface="Consolas" panose="020B0609020204030204" pitchFamily="49" charset="0"/>
+              </a:rPr>
+              <a:t>    </a:t>
+            </a:r>
+            <a:r>
+              <a:rPr lang="en-US" sz="1200" b="1" dirty="0">
+                <a:solidFill>
+                  <a:srgbClr val="EE9999"/>
+                </a:solidFill>
+                <a:latin typeface="Consolas" panose="020B0609020204030204" pitchFamily="49" charset="0"/>
+              </a:rPr>
+              <a:t>,</a:t>
+            </a:r>
+            <a:r>
+              <a:rPr lang="en-US" sz="1200" dirty="0">
+                <a:solidFill>
+                  <a:srgbClr val="0000FF"/>
+                </a:solidFill>
+                <a:latin typeface="Consolas" panose="020B0609020204030204" pitchFamily="49" charset="0"/>
+              </a:rPr>
+              <a:t>count</a:t>
+            </a:r>
+            <a:r>
+              <a:rPr lang="en-US" sz="1200" b="1" dirty="0">
+                <a:solidFill>
+                  <a:srgbClr val="EE9999"/>
+                </a:solidFill>
+                <a:latin typeface="Consolas" panose="020B0609020204030204" pitchFamily="49" charset="0"/>
+              </a:rPr>
+              <a:t>(</a:t>
+            </a:r>
+            <a:r>
+              <a:rPr lang="en-US" sz="1200" dirty="0">
+                <a:solidFill>
+                  <a:srgbClr val="000000"/>
+                </a:solidFill>
+                <a:latin typeface="Consolas" panose="020B0609020204030204" pitchFamily="49" charset="0"/>
+              </a:rPr>
+              <a:t>T</a:t>
+            </a:r>
+            <a:r>
+              <a:rPr lang="en-US" sz="1200" b="1" dirty="0">
+                <a:solidFill>
+                  <a:srgbClr val="EE9999"/>
+                </a:solidFill>
+                <a:latin typeface="Consolas" panose="020B0609020204030204" pitchFamily="49" charset="0"/>
+              </a:rPr>
+              <a:t>.</a:t>
+            </a:r>
+            <a:r>
+              <a:rPr lang="en-US" sz="1200" dirty="0">
+                <a:solidFill>
+                  <a:srgbClr val="000000"/>
+                </a:solidFill>
+                <a:latin typeface="Consolas" panose="020B0609020204030204" pitchFamily="49" charset="0"/>
+              </a:rPr>
+              <a:t>TrackID</a:t>
+            </a:r>
+            <a:r>
+              <a:rPr lang="en-US" sz="1200" b="1" dirty="0">
+                <a:solidFill>
+                  <a:srgbClr val="EE9999"/>
+                </a:solidFill>
+                <a:latin typeface="Consolas" panose="020B0609020204030204" pitchFamily="49" charset="0"/>
+              </a:rPr>
+              <a:t>) </a:t>
+            </a:r>
+            <a:r>
+              <a:rPr lang="en-US" sz="1200" dirty="0">
+                <a:solidFill>
+                  <a:srgbClr val="0000FF"/>
+                </a:solidFill>
+                <a:latin typeface="Consolas" panose="020B0609020204030204" pitchFamily="49" charset="0"/>
+              </a:rPr>
+              <a:t>as </a:t>
+            </a:r>
+            <a:r>
+              <a:rPr lang="en-US" sz="1200" dirty="0">
+                <a:solidFill>
+                  <a:srgbClr val="000000"/>
+                </a:solidFill>
+                <a:latin typeface="Consolas" panose="020B0609020204030204" pitchFamily="49" charset="0"/>
+              </a:rPr>
+              <a:t>numberTracks </a:t>
+            </a:r>
+            <a:r>
+              <a:rPr lang="en-US" sz="1200" dirty="0">
+                <a:solidFill>
+                  <a:srgbClr val="6B8E23"/>
+                </a:solidFill>
+                <a:latin typeface="Consolas" panose="020B0609020204030204" pitchFamily="49" charset="0"/>
+              </a:rPr>
+              <a:t>--&lt;3&gt;</a:t>
+            </a:r>
+          </a:p>
+          <a:p>
+            <a:r>
+              <a:rPr lang="en-US" sz="1200" dirty="0">
+                <a:solidFill>
+                  <a:srgbClr val="0000FF"/>
+                </a:solidFill>
+                <a:latin typeface="Consolas" panose="020B0609020204030204" pitchFamily="49" charset="0"/>
+              </a:rPr>
+              <a:t>from </a:t>
+            </a:r>
+            <a:r>
+              <a:rPr lang="en-US" sz="1200" dirty="0">
+                <a:solidFill>
+                  <a:srgbClr val="000000"/>
+                </a:solidFill>
+                <a:latin typeface="Consolas" panose="020B0609020204030204" pitchFamily="49" charset="0"/>
+              </a:rPr>
+              <a:t>Track T    </a:t>
+            </a:r>
+          </a:p>
+          <a:p>
             <a:endParaRPr lang="en-US" sz="1200" dirty="0">
               <a:solidFill>
                 <a:srgbClr val="000000"/>
@@ -7123,224 +7272,114 @@
           </a:p>
           <a:p>
             <a:r>
+              <a:rPr lang="en-US" b="1" dirty="0">
+                <a:solidFill>
+                  <a:srgbClr val="0000FF"/>
+                </a:solidFill>
+                <a:latin typeface="Consolas" panose="020B0609020204030204" pitchFamily="49" charset="0"/>
+              </a:rPr>
+              <a:t>right</a:t>
+            </a:r>
+            <a:r>
+              <a:rPr lang="en-US" sz="1200" dirty="0">
+                <a:solidFill>
+                  <a:srgbClr val="0000FF"/>
+                </a:solidFill>
+                <a:latin typeface="Consolas" panose="020B0609020204030204" pitchFamily="49" charset="0"/>
+              </a:rPr>
+              <a:t> outer Join </a:t>
+            </a:r>
+            <a:r>
               <a:rPr lang="en-US" sz="1200" dirty="0">
                 <a:solidFill>
                   <a:srgbClr val="000000"/>
                 </a:solidFill>
                 <a:latin typeface="Consolas" panose="020B0609020204030204" pitchFamily="49" charset="0"/>
               </a:rPr>
-              <a:t>    </a:t>
-            </a:r>
-            <a:r>
-              <a:rPr lang="en-US" sz="1200" b="1" dirty="0">
+              <a:t>Genre G   </a:t>
+            </a:r>
+            <a:r>
+              <a:rPr lang="en-US" sz="1200" dirty="0">
+                <a:solidFill>
+                  <a:srgbClr val="6B8E23"/>
+                </a:solidFill>
+                <a:latin typeface="Consolas" panose="020B0609020204030204" pitchFamily="49" charset="0"/>
+              </a:rPr>
+              <a:t>--&lt;6&gt;</a:t>
+            </a:r>
+          </a:p>
+          <a:p>
+            <a:r>
+              <a:rPr lang="nl-NL" sz="1200" dirty="0">
+                <a:solidFill>
+                  <a:srgbClr val="0000FF"/>
+                </a:solidFill>
+                <a:latin typeface="Consolas" panose="020B0609020204030204" pitchFamily="49" charset="0"/>
+              </a:rPr>
+              <a:t>on </a:t>
+            </a:r>
+            <a:r>
+              <a:rPr lang="nl-NL" sz="1200" dirty="0">
+                <a:solidFill>
+                  <a:srgbClr val="000000"/>
+                </a:solidFill>
+                <a:latin typeface="Consolas" panose="020B0609020204030204" pitchFamily="49" charset="0"/>
+              </a:rPr>
+              <a:t>G</a:t>
+            </a:r>
+            <a:r>
+              <a:rPr lang="nl-NL" sz="1200" b="1" dirty="0">
                 <a:solidFill>
                   <a:srgbClr val="EE9999"/>
                 </a:solidFill>
                 <a:latin typeface="Consolas" panose="020B0609020204030204" pitchFamily="49" charset="0"/>
               </a:rPr>
-              <a:t>,</a:t>
-            </a:r>
-            <a:r>
-              <a:rPr lang="en-US" sz="1200" dirty="0" err="1">
+              <a:t>.</a:t>
+            </a:r>
+            <a:r>
+              <a:rPr lang="nl-NL" sz="1200" dirty="0">
                 <a:solidFill>
                   <a:srgbClr val="000000"/>
                 </a:solidFill>
                 <a:latin typeface="Consolas" panose="020B0609020204030204" pitchFamily="49" charset="0"/>
               </a:rPr>
-              <a:t>G</a:t>
-            </a:r>
-            <a:r>
-              <a:rPr lang="en-US" sz="1200" b="1" dirty="0" err="1">
+              <a:t>GenreID </a:t>
+            </a:r>
+            <a:r>
+              <a:rPr lang="nl-NL" sz="1200" b="1" dirty="0">
                 <a:solidFill>
                   <a:srgbClr val="EE9999"/>
                 </a:solidFill>
                 <a:latin typeface="Consolas" panose="020B0609020204030204" pitchFamily="49" charset="0"/>
               </a:rPr>
+              <a:t>= </a:t>
+            </a:r>
+            <a:r>
+              <a:rPr lang="nl-NL" sz="1200" dirty="0">
+                <a:solidFill>
+                  <a:srgbClr val="000000"/>
+                </a:solidFill>
+                <a:latin typeface="Consolas" panose="020B0609020204030204" pitchFamily="49" charset="0"/>
+              </a:rPr>
+              <a:t>T</a:t>
+            </a:r>
+            <a:r>
+              <a:rPr lang="nl-NL" sz="1200" b="1" dirty="0">
+                <a:solidFill>
+                  <a:srgbClr val="EE9999"/>
+                </a:solidFill>
+                <a:latin typeface="Consolas" panose="020B0609020204030204" pitchFamily="49" charset="0"/>
+              </a:rPr>
               <a:t>.</a:t>
             </a:r>
             <a:r>
-              <a:rPr lang="en-US" sz="1200" dirty="0" err="1">
+              <a:rPr lang="nl-NL" sz="1200" dirty="0">
                 <a:solidFill>
                   <a:srgbClr val="000000"/>
                 </a:solidFill>
                 <a:latin typeface="Consolas" panose="020B0609020204030204" pitchFamily="49" charset="0"/>
               </a:rPr>
-              <a:t>Name</a:t>
-            </a:r>
-            <a:r>
-              <a:rPr lang="en-US" sz="1200" dirty="0">
-                <a:solidFill>
-                  <a:srgbClr val="000000"/>
-                </a:solidFill>
-                <a:latin typeface="Consolas" panose="020B0609020204030204" pitchFamily="49" charset="0"/>
-              </a:rPr>
-              <a:t> </a:t>
-            </a:r>
-            <a:r>
-              <a:rPr lang="en-US" sz="1200" dirty="0">
-                <a:solidFill>
-                  <a:srgbClr val="0000FF"/>
-                </a:solidFill>
-                <a:latin typeface="Consolas" panose="020B0609020204030204" pitchFamily="49" charset="0"/>
-              </a:rPr>
-              <a:t>as </a:t>
-            </a:r>
-            <a:r>
-              <a:rPr lang="en-US" sz="1200" dirty="0" err="1">
-                <a:solidFill>
-                  <a:srgbClr val="000000"/>
-                </a:solidFill>
-                <a:latin typeface="Consolas" panose="020B0609020204030204" pitchFamily="49" charset="0"/>
-              </a:rPr>
-              <a:t>genreName</a:t>
-            </a:r>
-            <a:r>
-              <a:rPr lang="en-US" sz="1200" dirty="0">
-                <a:solidFill>
-                  <a:srgbClr val="000000"/>
-                </a:solidFill>
-                <a:latin typeface="Consolas" panose="020B0609020204030204" pitchFamily="49" charset="0"/>
-              </a:rPr>
-              <a:t>  </a:t>
-            </a:r>
-            <a:r>
-              <a:rPr lang="en-US" sz="1200" dirty="0">
-                <a:solidFill>
-                  <a:srgbClr val="6B8E23"/>
-                </a:solidFill>
-                <a:latin typeface="Consolas" panose="020B0609020204030204" pitchFamily="49" charset="0"/>
-              </a:rPr>
-              <a:t>--&lt;1&gt;    </a:t>
-            </a:r>
-          </a:p>
-          <a:p>
-            <a:r>
-              <a:rPr lang="en-US" sz="1200" dirty="0">
-                <a:solidFill>
-                  <a:srgbClr val="6B8E23"/>
-                </a:solidFill>
-                <a:latin typeface="Consolas" panose="020B0609020204030204" pitchFamily="49" charset="0"/>
-              </a:rPr>
-              <a:t>    </a:t>
-            </a:r>
-            <a:r>
-              <a:rPr lang="en-US" sz="1200" b="1" dirty="0">
-                <a:solidFill>
-                  <a:srgbClr val="EE9999"/>
-                </a:solidFill>
-                <a:latin typeface="Consolas" panose="020B0609020204030204" pitchFamily="49" charset="0"/>
-              </a:rPr>
-              <a:t>,</a:t>
-            </a:r>
-            <a:r>
-              <a:rPr lang="en-US" sz="1200" dirty="0">
-                <a:solidFill>
-                  <a:srgbClr val="0000FF"/>
-                </a:solidFill>
-                <a:latin typeface="Consolas" panose="020B0609020204030204" pitchFamily="49" charset="0"/>
-              </a:rPr>
-              <a:t>count</a:t>
-            </a:r>
-            <a:r>
-              <a:rPr lang="en-US" sz="1200" b="1" dirty="0">
-                <a:solidFill>
-                  <a:srgbClr val="EE9999"/>
-                </a:solidFill>
-                <a:latin typeface="Consolas" panose="020B0609020204030204" pitchFamily="49" charset="0"/>
-              </a:rPr>
-              <a:t>(</a:t>
-            </a:r>
-            <a:r>
-              <a:rPr lang="en-US" sz="1200" dirty="0" err="1">
-                <a:solidFill>
-                  <a:srgbClr val="000000"/>
-                </a:solidFill>
-                <a:latin typeface="Consolas" panose="020B0609020204030204" pitchFamily="49" charset="0"/>
-              </a:rPr>
-              <a:t>T</a:t>
-            </a:r>
-            <a:r>
-              <a:rPr lang="en-US" sz="1200" b="1" dirty="0" err="1">
-                <a:solidFill>
-                  <a:srgbClr val="EE9999"/>
-                </a:solidFill>
-                <a:latin typeface="Consolas" panose="020B0609020204030204" pitchFamily="49" charset="0"/>
-              </a:rPr>
-              <a:t>.</a:t>
-            </a:r>
-            <a:r>
-              <a:rPr lang="en-US" sz="1200" dirty="0" err="1">
-                <a:solidFill>
-                  <a:srgbClr val="000000"/>
-                </a:solidFill>
-                <a:latin typeface="Consolas" panose="020B0609020204030204" pitchFamily="49" charset="0"/>
-              </a:rPr>
-              <a:t>TrackID</a:t>
-            </a:r>
-            <a:r>
-              <a:rPr lang="en-US" sz="1200" b="1" dirty="0">
-                <a:solidFill>
-                  <a:srgbClr val="EE9999"/>
-                </a:solidFill>
-                <a:latin typeface="Consolas" panose="020B0609020204030204" pitchFamily="49" charset="0"/>
-              </a:rPr>
-              <a:t>) </a:t>
-            </a:r>
-            <a:r>
-              <a:rPr lang="en-US" sz="1200" dirty="0">
-                <a:solidFill>
-                  <a:srgbClr val="0000FF"/>
-                </a:solidFill>
-                <a:latin typeface="Consolas" panose="020B0609020204030204" pitchFamily="49" charset="0"/>
-              </a:rPr>
-              <a:t>as </a:t>
-            </a:r>
-            <a:r>
-              <a:rPr lang="en-US" sz="1200" dirty="0" err="1">
-                <a:solidFill>
-                  <a:srgbClr val="000000"/>
-                </a:solidFill>
-                <a:latin typeface="Consolas" panose="020B0609020204030204" pitchFamily="49" charset="0"/>
-              </a:rPr>
-              <a:t>numberTracks</a:t>
-            </a:r>
-            <a:r>
-              <a:rPr lang="en-US" sz="1200" dirty="0">
-                <a:solidFill>
-                  <a:srgbClr val="000000"/>
-                </a:solidFill>
-                <a:latin typeface="Consolas" panose="020B0609020204030204" pitchFamily="49" charset="0"/>
-              </a:rPr>
-              <a:t> </a:t>
-            </a:r>
-            <a:r>
-              <a:rPr lang="en-US" sz="1200" dirty="0">
-                <a:solidFill>
-                  <a:srgbClr val="6B8E23"/>
-                </a:solidFill>
-                <a:latin typeface="Consolas" panose="020B0609020204030204" pitchFamily="49" charset="0"/>
-              </a:rPr>
-              <a:t>--&lt;3&gt;</a:t>
-            </a:r>
-          </a:p>
-          <a:p>
-            <a:r>
-              <a:rPr lang="en-US" sz="1200" dirty="0">
-                <a:solidFill>
-                  <a:srgbClr val="0000FF"/>
-                </a:solidFill>
-                <a:latin typeface="Consolas" panose="020B0609020204030204" pitchFamily="49" charset="0"/>
-              </a:rPr>
-              <a:t>from </a:t>
-            </a:r>
-            <a:r>
-              <a:rPr lang="en-US" sz="1200" dirty="0">
-                <a:solidFill>
-                  <a:srgbClr val="000000"/>
-                </a:solidFill>
-                <a:latin typeface="Consolas" panose="020B0609020204030204" pitchFamily="49" charset="0"/>
-              </a:rPr>
-              <a:t>Track T    </a:t>
+              <a:t>GenreID</a:t>
             </a:r>
           </a:p>
           <a:p>
@@ -7353,14 +7392,16 @@
           </a:p>
           <a:p>
             <a:r>
-              <a:rPr lang="en-US" b="1" dirty="0">
+              <a:rPr lang="en-US" sz="1200" dirty="0">
                 <a:solidFill>
                   <a:srgbClr val="0000FF"/>
                 </a:solidFill>
                 <a:latin typeface="Consolas" panose="020B0609020204030204" pitchFamily="49" charset="0"/>
               </a:rPr>
-              <a:t>right</a:t>
-            </a:r>
+              <a:t>Group by</a:t>
+            </a:r>
+          </a:p>
+          <a:p>
             <a:r>
               <a:rPr lang="en-US" sz="1200" dirty="0">
                 <a:solidFill>
@@ -7368,7 +7409,7 @@
                 </a:solidFill>
                 <a:latin typeface="Consolas" panose="020B0609020204030204" pitchFamily="49" charset="0"/>
               </a:rPr>
-              <a:t> outer Join </a:t>
+              <a:t>	</a:t>
             </a:r>
             <a:r>
               <a:rPr lang="en-US" sz="1200" dirty="0">
@@ -7377,7 +7418,54 @@
                 </a:solidFill>
                 <a:latin typeface="Consolas" panose="020B0609020204030204" pitchFamily="49" charset="0"/>
               </a:rPr>
-              <a:t>Genre G   </a:t>
+              <a:t>G</a:t>
+            </a:r>
+            <a:r>
+              <a:rPr lang="en-US" sz="1200" b="1" dirty="0">
+                <a:solidFill>
+                  <a:srgbClr val="EE9999"/>
+                </a:solidFill>
+                <a:latin typeface="Consolas" panose="020B0609020204030204" pitchFamily="49" charset="0"/>
+              </a:rPr>
+              <a:t>.</a:t>
+            </a:r>
+            <a:r>
+              <a:rPr lang="en-US" sz="1200" dirty="0">
+                <a:solidFill>
+                  <a:srgbClr val="000000"/>
+                </a:solidFill>
+                <a:latin typeface="Consolas" panose="020B0609020204030204" pitchFamily="49" charset="0"/>
+              </a:rPr>
+              <a:t>GenreID</a:t>
+            </a:r>
+          </a:p>
+          <a:p>
+            <a:r>
+              <a:rPr lang="en-US" sz="1200" dirty="0">
+                <a:solidFill>
+                  <a:srgbClr val="000000"/>
+                </a:solidFill>
+                <a:latin typeface="Consolas" panose="020B0609020204030204" pitchFamily="49" charset="0"/>
+              </a:rPr>
+              <a:t>	</a:t>
+            </a:r>
+            <a:r>
+              <a:rPr lang="en-US" sz="1200" b="1" dirty="0">
+                <a:solidFill>
+                  <a:srgbClr val="EE9999"/>
+                </a:solidFill>
+                <a:latin typeface="Consolas" panose="020B0609020204030204" pitchFamily="49" charset="0"/>
+              </a:rPr>
+              <a:t>,</a:t>
+            </a:r>
+            <a:r>
+              <a:rPr lang="en-US" sz="1200" dirty="0">
+                <a:solidFill>
+                  <a:srgbClr val="000000"/>
+                </a:solidFill>
+                <a:latin typeface="Consolas" panose="020B0609020204030204" pitchFamily="49" charset="0"/>
+              </a:rPr>
+              <a:t>genreName   </a:t>
             </a:r>
             <a:r>
               <a:rPr lang="en-US" sz="1200" dirty="0">
@@ -7386,90 +7474,19 @@
                 </a:solidFill>
                 <a:latin typeface="Consolas" panose="020B0609020204030204" pitchFamily="49" charset="0"/>
               </a:rPr>
-              <a:t>--&lt;6&gt;</a:t>
-            </a:r>
-          </a:p>
-          <a:p>
-            <a:r>
-              <a:rPr lang="nl-NL" sz="1200" dirty="0">
+              <a:t>--&lt;5&gt;</a:t>
+            </a:r>
+          </a:p>
+          <a:p>
+            <a:r>
+              <a:rPr lang="en-US" sz="1200" dirty="0">
                 <a:solidFill>
                   <a:srgbClr val="0000FF"/>
                 </a:solidFill>
                 <a:latin typeface="Consolas" panose="020B0609020204030204" pitchFamily="49" charset="0"/>
               </a:rPr>
-              <a:t>on </a:t>
-            </a:r>
-            <a:r>
-              <a:rPr lang="nl-NL" sz="1200" dirty="0">
-                <a:solidFill>
-                  <a:srgbClr val="000000"/>
-                </a:solidFill>
-                <a:latin typeface="Consolas" panose="020B0609020204030204" pitchFamily="49" charset="0"/>
-              </a:rPr>
-              <a:t>G</a:t>
-            </a:r>
-            <a:r>
-              <a:rPr lang="nl-NL" sz="1200" b="1" dirty="0">
-                <a:solidFill>
-                  <a:srgbClr val="EE9999"/>
-                </a:solidFill>
-                <a:latin typeface="Consolas" panose="020B0609020204030204" pitchFamily="49" charset="0"/>
-              </a:rPr>
-              <a:t>.</a:t>
-            </a:r>
-            <a:r>
-              <a:rPr lang="nl-NL" sz="1200" dirty="0">
-                <a:solidFill>
-                  <a:srgbClr val="000000"/>
-                </a:solidFill>
-                <a:latin typeface="Consolas" panose="020B0609020204030204" pitchFamily="49" charset="0"/>
-              </a:rPr>
-              <a:t>GenreID </a:t>
-            </a:r>
-            <a:r>
-              <a:rPr lang="nl-NL" sz="1200" b="1" dirty="0">
-                <a:solidFill>
-                  <a:srgbClr val="EE9999"/>
-                </a:solidFill>
-                <a:latin typeface="Consolas" panose="020B0609020204030204" pitchFamily="49" charset="0"/>
-              </a:rPr>
-              <a:t>= </a:t>
-            </a:r>
-            <a:r>
-              <a:rPr lang="nl-NL" sz="1200" dirty="0">
-                <a:solidFill>
-                  <a:srgbClr val="000000"/>
-                </a:solidFill>
-                <a:latin typeface="Consolas" panose="020B0609020204030204" pitchFamily="49" charset="0"/>
-              </a:rPr>
-              <a:t>T</a:t>
-            </a:r>
-            <a:r>
-              <a:rPr lang="nl-NL" sz="1200" b="1" dirty="0">
-                <a:solidFill>
-                  <a:srgbClr val="EE9999"/>
-                </a:solidFill>
-                <a:latin typeface="Consolas" panose="020B0609020204030204" pitchFamily="49" charset="0"/>
-              </a:rPr>
-              <a:t>.</a:t>
-            </a:r>
-            <a:r>
-              <a:rPr lang="nl-NL" sz="1200" dirty="0">
-                <a:solidFill>
-                  <a:srgbClr val="000000"/>
-                </a:solidFill>
-                <a:latin typeface="Consolas" panose="020B0609020204030204" pitchFamily="49" charset="0"/>
-              </a:rPr>
-              <a:t>GenreID</a:t>
-            </a:r>
-          </a:p>
-          <a:p>
-            <a:endParaRPr lang="en-US" sz="1200" dirty="0">
-              <a:solidFill>
-                <a:srgbClr val="000000"/>
-              </a:solidFill>
-              <a:latin typeface="Consolas" panose="020B0609020204030204" pitchFamily="49" charset="0"/>
-            </a:endParaRPr>
+              <a:t>order by </a:t>
+            </a:r>
           </a:p>
           <a:p>
             <a:r>
@@ -7479,123 +7496,10 @@
                 </a:solidFill>
                 <a:latin typeface="Consolas" panose="020B0609020204030204" pitchFamily="49" charset="0"/>
               </a:rPr>
-              <a:t>Group by</a:t>
-            </a:r>
-          </a:p>
-          <a:p>
-            <a:r>
-              <a:rPr lang="en-US" sz="1200" dirty="0">
-                <a:solidFill>
-                  <a:srgbClr val="0000FF"/>
-                </a:solidFill>
-                <a:latin typeface="Consolas" panose="020B0609020204030204" pitchFamily="49" charset="0"/>
-              </a:rPr>
               <a:t>	</a:t>
             </a:r>
             <a:r>
-              <a:rPr lang="en-US" sz="1200" dirty="0" err="1">
-                <a:solidFill>
-                  <a:srgbClr val="000000"/>
-                </a:solidFill>
-                <a:latin typeface="Consolas" panose="020B0609020204030204" pitchFamily="49" charset="0"/>
-              </a:rPr>
-              <a:t>G</a:t>
-            </a:r>
-            <a:r>
-              <a:rPr lang="en-US" sz="1200" b="1" dirty="0" err="1">
-                <a:solidFill>
-                  <a:srgbClr val="EE9999"/>
-                </a:solidFill>
-                <a:latin typeface="Consolas" panose="020B0609020204030204" pitchFamily="49" charset="0"/>
-              </a:rPr>
-              <a:t>.</a:t>
-            </a:r>
-            <a:r>
-              <a:rPr lang="en-US" sz="1200" dirty="0" err="1">
-                <a:solidFill>
-                  <a:srgbClr val="000000"/>
-                </a:solidFill>
-                <a:latin typeface="Consolas" panose="020B0609020204030204" pitchFamily="49" charset="0"/>
-              </a:rPr>
-              <a:t>GenreID</a:t>
-            </a:r>
-            <a:endParaRPr lang="en-US" sz="1200" dirty="0">
-              <a:solidFill>
-                <a:srgbClr val="000000"/>
-              </a:solidFill>
-              <a:latin typeface="Consolas" panose="020B0609020204030204" pitchFamily="49" charset="0"/>
-            </a:endParaRPr>
-          </a:p>
-          <a:p>
-            <a:r>
-              <a:rPr lang="en-US" sz="1200" dirty="0">
-                <a:solidFill>
-                  <a:srgbClr val="000000"/>
-                </a:solidFill>
-                <a:latin typeface="Consolas" panose="020B0609020204030204" pitchFamily="49" charset="0"/>
-              </a:rPr>
-              <a:t>	</a:t>
-            </a:r>
-            <a:r>
-              <a:rPr lang="en-US" sz="1200" b="1" dirty="0">
-                <a:solidFill>
-                  <a:srgbClr val="EE9999"/>
-                </a:solidFill>
-                <a:latin typeface="Consolas" panose="020B0609020204030204" pitchFamily="49" charset="0"/>
-              </a:rPr>
-              <a:t>,</a:t>
-            </a:r>
-            <a:r>
-              <a:rPr lang="en-US" sz="1200" dirty="0" err="1">
-                <a:solidFill>
-                  <a:srgbClr val="000000"/>
-                </a:solidFill>
-                <a:latin typeface="Consolas" panose="020B0609020204030204" pitchFamily="49" charset="0"/>
-              </a:rPr>
-              <a:t>genreName</a:t>
-            </a:r>
-            <a:r>
-              <a:rPr lang="en-US" sz="1200" dirty="0">
-                <a:solidFill>
-                  <a:srgbClr val="000000"/>
-                </a:solidFill>
-                <a:latin typeface="Consolas" panose="020B0609020204030204" pitchFamily="49" charset="0"/>
-              </a:rPr>
-              <a:t>   </a:t>
-            </a:r>
-            <a:r>
-              <a:rPr lang="en-US" sz="1200" dirty="0">
-                <a:solidFill>
-                  <a:srgbClr val="6B8E23"/>
-                </a:solidFill>
-                <a:latin typeface="Consolas" panose="020B0609020204030204" pitchFamily="49" charset="0"/>
-              </a:rPr>
-              <a:t>--&lt;5&gt;</a:t>
-            </a:r>
-          </a:p>
-          <a:p>
-            <a:r>
-              <a:rPr lang="en-US" sz="1200" dirty="0">
-                <a:solidFill>
-                  <a:srgbClr val="0000FF"/>
-                </a:solidFill>
-                <a:latin typeface="Consolas" panose="020B0609020204030204" pitchFamily="49" charset="0"/>
-              </a:rPr>
-              <a:t>order by </a:t>
-            </a:r>
-          </a:p>
-          <a:p>
-            <a:r>
-              <a:rPr lang="en-US" sz="1200" dirty="0">
-                <a:solidFill>
-                  <a:srgbClr val="0000FF"/>
-                </a:solidFill>
-                <a:latin typeface="Consolas" panose="020B0609020204030204" pitchFamily="49" charset="0"/>
-              </a:rPr>
-              <a:t>	</a:t>
-            </a:r>
-            <a:r>
-              <a:rPr lang="en-US" sz="1200" dirty="0" err="1">
+              <a:rPr lang="en-US" sz="1200" dirty="0">
                 <a:solidFill>
                   <a:srgbClr val="000000"/>
                 </a:solidFill>
@@ -8843,7 +8747,7 @@
               <a:t>    </a:t>
             </a:r>
             <a:r>
-              <a:rPr lang="en-US" sz="1200" dirty="0" err="1">
+              <a:rPr lang="en-US" sz="1200" dirty="0">
                 <a:solidFill>
                   <a:srgbClr val="000000"/>
                 </a:solidFill>
@@ -8852,7 +8756,7 @@
               <a:t>G</a:t>
             </a:r>
             <a:r>
-              <a:rPr lang="en-US" sz="1200" b="1" dirty="0" err="1">
+              <a:rPr lang="en-US" sz="1200" b="1" dirty="0">
                 <a:solidFill>
                   <a:srgbClr val="EE9999"/>
                 </a:solidFill>
@@ -8861,7 +8765,7 @@
               <a:t>.</a:t>
             </a:r>
             <a:r>
-              <a:rPr lang="en-US" sz="1200" dirty="0" err="1">
+              <a:rPr lang="en-US" sz="1200" dirty="0">
                 <a:solidFill>
                   <a:srgbClr val="000000"/>
                 </a:solidFill>
@@ -8869,6 +8773,203 @@
               </a:rPr>
               <a:t>GenreID</a:t>
             </a:r>
+          </a:p>
+          <a:p>
+            <a:r>
+              <a:rPr lang="en-US" sz="1200" dirty="0">
+                <a:solidFill>
+                  <a:srgbClr val="000000"/>
+                </a:solidFill>
+                <a:latin typeface="Consolas" panose="020B0609020204030204" pitchFamily="49" charset="0"/>
+              </a:rPr>
+              <a:t>    </a:t>
+            </a:r>
+            <a:r>
+              <a:rPr lang="en-US" sz="1200" b="1" dirty="0">
+                <a:solidFill>
+                  <a:srgbClr val="EE9999"/>
+                </a:solidFill>
+                <a:latin typeface="Consolas" panose="020B0609020204030204" pitchFamily="49" charset="0"/>
+              </a:rPr>
+              <a:t>,</a:t>
+            </a:r>
+            <a:r>
+              <a:rPr lang="en-US" sz="1200" dirty="0">
+                <a:solidFill>
+                  <a:srgbClr val="000000"/>
+                </a:solidFill>
+                <a:latin typeface="Consolas" panose="020B0609020204030204" pitchFamily="49" charset="0"/>
+              </a:rPr>
+              <a:t>G</a:t>
+            </a:r>
+            <a:r>
+              <a:rPr lang="en-US" sz="1200" b="1" dirty="0">
+                <a:solidFill>
+                  <a:srgbClr val="EE9999"/>
+                </a:solidFill>
+                <a:latin typeface="Consolas" panose="020B0609020204030204" pitchFamily="49" charset="0"/>
+              </a:rPr>
+              <a:t>.</a:t>
+            </a:r>
+            <a:r>
+              <a:rPr lang="en-US" sz="1200" dirty="0">
+                <a:solidFill>
+                  <a:srgbClr val="000000"/>
+                </a:solidFill>
+                <a:latin typeface="Consolas" panose="020B0609020204030204" pitchFamily="49" charset="0"/>
+              </a:rPr>
+              <a:t>Name </a:t>
+            </a:r>
+            <a:r>
+              <a:rPr lang="en-US" sz="1200" dirty="0">
+                <a:solidFill>
+                  <a:srgbClr val="0000FF"/>
+                </a:solidFill>
+                <a:latin typeface="Consolas" panose="020B0609020204030204" pitchFamily="49" charset="0"/>
+              </a:rPr>
+              <a:t>as </a:t>
+            </a:r>
+            <a:r>
+              <a:rPr lang="en-US" sz="1200" dirty="0">
+                <a:solidFill>
+                  <a:srgbClr val="000000"/>
+                </a:solidFill>
+                <a:latin typeface="Consolas" panose="020B0609020204030204" pitchFamily="49" charset="0"/>
+              </a:rPr>
+              <a:t>genreName  </a:t>
+            </a:r>
+            <a:r>
+              <a:rPr lang="en-US" sz="1200" dirty="0">
+                <a:solidFill>
+                  <a:srgbClr val="6B8E23"/>
+                </a:solidFill>
+                <a:latin typeface="Consolas" panose="020B0609020204030204" pitchFamily="49" charset="0"/>
+              </a:rPr>
+              <a:t>--&lt;1&gt;    </a:t>
+            </a:r>
+          </a:p>
+          <a:p>
+            <a:r>
+              <a:rPr lang="en-US" sz="1200" dirty="0">
+                <a:solidFill>
+                  <a:srgbClr val="6B8E23"/>
+                </a:solidFill>
+                <a:latin typeface="Consolas" panose="020B0609020204030204" pitchFamily="49" charset="0"/>
+              </a:rPr>
+              <a:t>    </a:t>
+            </a:r>
+            <a:r>
+              <a:rPr lang="en-US" sz="1200" b="1" dirty="0">
+                <a:solidFill>
+                  <a:srgbClr val="EE9999"/>
+                </a:solidFill>
+                <a:latin typeface="Consolas" panose="020B0609020204030204" pitchFamily="49" charset="0"/>
+              </a:rPr>
+              <a:t>,</a:t>
+            </a:r>
+            <a:r>
+              <a:rPr lang="en-US" sz="1200" dirty="0">
+                <a:solidFill>
+                  <a:srgbClr val="0000FF"/>
+                </a:solidFill>
+                <a:latin typeface="Consolas" panose="020B0609020204030204" pitchFamily="49" charset="0"/>
+              </a:rPr>
+              <a:t>count</a:t>
+            </a:r>
+            <a:r>
+              <a:rPr lang="en-US" sz="1200" b="1" dirty="0">
+                <a:solidFill>
+                  <a:srgbClr val="EE9999"/>
+                </a:solidFill>
+                <a:latin typeface="Consolas" panose="020B0609020204030204" pitchFamily="49" charset="0"/>
+              </a:rPr>
+              <a:t>(</a:t>
+            </a:r>
+            <a:r>
+              <a:rPr lang="en-US" sz="1200" dirty="0">
+                <a:solidFill>
+                  <a:srgbClr val="000000"/>
+                </a:solidFill>
+                <a:latin typeface="Consolas" panose="020B0609020204030204" pitchFamily="49" charset="0"/>
+              </a:rPr>
+              <a:t>T</a:t>
+            </a:r>
+            <a:r>
+              <a:rPr lang="en-US" sz="1200" b="1" dirty="0">
+                <a:solidFill>
+                  <a:srgbClr val="EE9999"/>
+                </a:solidFill>
+                <a:latin typeface="Consolas" panose="020B0609020204030204" pitchFamily="49" charset="0"/>
+              </a:rPr>
+              <a:t>.</a:t>
+            </a:r>
+            <a:r>
+              <a:rPr lang="en-US" sz="1200" dirty="0">
+                <a:solidFill>
+                  <a:srgbClr val="000000"/>
+                </a:solidFill>
+                <a:latin typeface="Consolas" panose="020B0609020204030204" pitchFamily="49" charset="0"/>
+              </a:rPr>
+              <a:t>TrackID</a:t>
+            </a:r>
+            <a:r>
+              <a:rPr lang="en-US" sz="1200" b="1" dirty="0">
+                <a:solidFill>
+                  <a:srgbClr val="EE9999"/>
+                </a:solidFill>
+                <a:latin typeface="Consolas" panose="020B0609020204030204" pitchFamily="49" charset="0"/>
+              </a:rPr>
+              <a:t>) </a:t>
+            </a:r>
+            <a:r>
+              <a:rPr lang="en-US" sz="1200" dirty="0">
+                <a:solidFill>
+                  <a:srgbClr val="0000FF"/>
+                </a:solidFill>
+                <a:latin typeface="Consolas" panose="020B0609020204030204" pitchFamily="49" charset="0"/>
+              </a:rPr>
+              <a:t>as </a:t>
+            </a:r>
+            <a:r>
+              <a:rPr lang="en-US" sz="1200" dirty="0">
+                <a:solidFill>
+                  <a:srgbClr val="000000"/>
+                </a:solidFill>
+                <a:latin typeface="Consolas" panose="020B0609020204030204" pitchFamily="49" charset="0"/>
+              </a:rPr>
+              <a:t>numberTracks </a:t>
+            </a:r>
+            <a:r>
+              <a:rPr lang="en-US" sz="1200" dirty="0">
+                <a:solidFill>
+                  <a:srgbClr val="6B8E23"/>
+                </a:solidFill>
+                <a:latin typeface="Consolas" panose="020B0609020204030204" pitchFamily="49" charset="0"/>
+              </a:rPr>
+              <a:t>--&lt;3&gt;</a:t>
+            </a:r>
+          </a:p>
+          <a:p>
+            <a:r>
+              <a:rPr lang="en-US" sz="1200" dirty="0">
+                <a:solidFill>
+                  <a:srgbClr val="0000FF"/>
+                </a:solidFill>
+                <a:latin typeface="Consolas" panose="020B0609020204030204" pitchFamily="49" charset="0"/>
+              </a:rPr>
+              <a:t>from </a:t>
+            </a:r>
+            <a:r>
+              <a:rPr lang="en-US" sz="1200" dirty="0">
+                <a:solidFill>
+                  <a:srgbClr val="000000"/>
+                </a:solidFill>
+                <a:latin typeface="Consolas" panose="020B0609020204030204" pitchFamily="49" charset="0"/>
+              </a:rPr>
+              <a:t>Genre G   </a:t>
+            </a:r>
+          </a:p>
+          <a:p>
             <a:endParaRPr lang="en-US" sz="1200" dirty="0">
               <a:solidFill>
                 <a:srgbClr val="000000"/>
@@ -8880,32 +8981,88 @@
             <a:r>
               <a:rPr lang="en-US" sz="1200" dirty="0">
                 <a:solidFill>
+                  <a:srgbClr val="0000FF"/>
+                </a:solidFill>
+                <a:latin typeface="Consolas" panose="020B0609020204030204" pitchFamily="49" charset="0"/>
+              </a:rPr>
+              <a:t>left outer Join </a:t>
+            </a:r>
+            <a:r>
+              <a:rPr lang="en-US" sz="1200" dirty="0">
+                <a:solidFill>
                   <a:srgbClr val="000000"/>
                 </a:solidFill>
                 <a:latin typeface="Consolas" panose="020B0609020204030204" pitchFamily="49" charset="0"/>
               </a:rPr>
-              <a:t>    </a:t>
-            </a:r>
-            <a:r>
-              <a:rPr lang="en-US" sz="1200" b="1" dirty="0">
+              <a:t>Track T  </a:t>
+            </a:r>
+            <a:r>
+              <a:rPr lang="en-US" sz="1200" dirty="0">
+                <a:solidFill>
+                  <a:srgbClr val="6B8E23"/>
+                </a:solidFill>
+                <a:latin typeface="Consolas" panose="020B0609020204030204" pitchFamily="49" charset="0"/>
+              </a:rPr>
+              <a:t>--&lt;6&gt;</a:t>
+            </a:r>
+          </a:p>
+          <a:p>
+            <a:r>
+              <a:rPr lang="nl-NL" sz="1200" dirty="0">
+                <a:solidFill>
+                  <a:srgbClr val="0000FF"/>
+                </a:solidFill>
+                <a:latin typeface="Consolas" panose="020B0609020204030204" pitchFamily="49" charset="0"/>
+              </a:rPr>
+              <a:t>on </a:t>
+            </a:r>
+            <a:r>
+              <a:rPr lang="nl-NL" sz="1200" dirty="0">
+                <a:solidFill>
+                  <a:srgbClr val="000000"/>
+                </a:solidFill>
+                <a:latin typeface="Consolas" panose="020B0609020204030204" pitchFamily="49" charset="0"/>
+              </a:rPr>
+              <a:t>T</a:t>
+            </a:r>
+            <a:r>
+              <a:rPr lang="nl-NL" sz="1200" b="1" dirty="0">
                 <a:solidFill>
                   <a:srgbClr val="EE9999"/>
                 </a:solidFill>
                 <a:latin typeface="Consolas" panose="020B0609020204030204" pitchFamily="49" charset="0"/>
               </a:rPr>
-              <a:t>,</a:t>
-            </a:r>
-            <a:r>
-              <a:rPr lang="en-US" sz="1200" dirty="0" err="1">
+              <a:t>.</a:t>
+            </a:r>
+            <a:r>
+              <a:rPr lang="nl-NL" sz="1200" dirty="0">
                 <a:solidFill>
                   <a:srgbClr val="000000"/>
                 </a:solidFill>
                 <a:latin typeface="Consolas" panose="020B0609020204030204" pitchFamily="49" charset="0"/>
               </a:rPr>
+              <a:t>GenreID </a:t>
+            </a:r>
+            <a:r>
+              <a:rPr lang="nl-NL" sz="1200" b="1" dirty="0">
+                <a:solidFill>
+                  <a:srgbClr val="EE9999"/>
+                </a:solidFill>
+                <a:latin typeface="Consolas" panose="020B0609020204030204" pitchFamily="49" charset="0"/>
+              </a:rPr>
+              <a:t>= </a:t>
+            </a:r>
+            <a:r>
+              <a:rPr lang="nl-NL" sz="1200" dirty="0">
+                <a:solidFill>
+                  <a:srgbClr val="000000"/>
+                </a:solidFill>
+                <a:latin typeface="Consolas" panose="020B0609020204030204" pitchFamily="49" charset="0"/>
+              </a:rPr>
               <a:t>G</a:t>
             </a:r>
             <a:r>
-              <a:rPr lang="en-US" sz="1200" b="1" dirty="0" err="1">
+              <a:rPr lang="nl-NL" sz="1200" b="1" dirty="0">
                 <a:solidFill>
                   <a:srgbClr val="EE9999"/>
                 </a:solidFill>
@@ -8914,188 +9071,13 @@
               <a:t>.</a:t>
             </a:r>
             <a:r>
-              <a:rPr lang="en-US" sz="1200" dirty="0" err="1">
+              <a:rPr lang="nl-NL" sz="1200" dirty="0">
                 <a:solidFill>
                   <a:srgbClr val="000000"/>
                 </a:solidFill>
                 <a:latin typeface="Consolas" panose="020B0609020204030204" pitchFamily="49" charset="0"/>
               </a:rPr>
-              <a:t>Name</a:t>
-            </a:r>
-            <a:r>
-              <a:rPr lang="en-US" sz="1200" dirty="0">
-                <a:solidFill>
-                  <a:srgbClr val="000000"/>
-                </a:solidFill>
-                <a:latin typeface="Consolas" panose="020B0609020204030204" pitchFamily="49" charset="0"/>
-              </a:rPr>
-              <a:t> </a:t>
-            </a:r>
-            <a:r>
-              <a:rPr lang="en-US" sz="1200" dirty="0">
-                <a:solidFill>
-                  <a:srgbClr val="0000FF"/>
-                </a:solidFill>
-                <a:latin typeface="Consolas" panose="020B0609020204030204" pitchFamily="49" charset="0"/>
-              </a:rPr>
-              <a:t>as </a:t>
-            </a:r>
-            <a:r>
-              <a:rPr lang="en-US" sz="1200" dirty="0" err="1">
-                <a:solidFill>
-                  <a:srgbClr val="000000"/>
-                </a:solidFill>
-                <a:latin typeface="Consolas" panose="020B0609020204030204" pitchFamily="49" charset="0"/>
-              </a:rPr>
-              <a:t>genreName</a:t>
-            </a:r>
-            <a:r>
-              <a:rPr lang="en-US" sz="1200" dirty="0">
-                <a:solidFill>
-                  <a:srgbClr val="000000"/>
-                </a:solidFill>
-                <a:latin typeface="Consolas" panose="020B0609020204030204" pitchFamily="49" charset="0"/>
-              </a:rPr>
-              <a:t>  </a:t>
-            </a:r>
-            <a:r>
-              <a:rPr lang="en-US" sz="1200" dirty="0">
-                <a:solidFill>
-                  <a:srgbClr val="6B8E23"/>
-                </a:solidFill>
-                <a:latin typeface="Consolas" panose="020B0609020204030204" pitchFamily="49" charset="0"/>
-              </a:rPr>
-              <a:t>--&lt;1&gt;    </a:t>
-            </a:r>
-          </a:p>
-          <a:p>
-            <a:r>
-              <a:rPr lang="en-US" sz="1200" dirty="0">
-                <a:solidFill>
-                  <a:srgbClr val="6B8E23"/>
-                </a:solidFill>
-                <a:latin typeface="Consolas" panose="020B0609020204030204" pitchFamily="49" charset="0"/>
-              </a:rPr>
-              <a:t>    </a:t>
-            </a:r>
-            <a:r>
-              <a:rPr lang="en-US" sz="1200" b="1" dirty="0">
-                <a:solidFill>
-                  <a:srgbClr val="EE9999"/>
-                </a:solidFill>
-                <a:latin typeface="Consolas" panose="020B0609020204030204" pitchFamily="49" charset="0"/>
-              </a:rPr>
-              <a:t>,</a:t>
-            </a:r>
-            <a:r>
-              <a:rPr lang="en-US" sz="1200" dirty="0">
-                <a:solidFill>
-                  <a:srgbClr val="0000FF"/>
-                </a:solidFill>
-                <a:latin typeface="Consolas" panose="020B0609020204030204" pitchFamily="49" charset="0"/>
-              </a:rPr>
-              <a:t>count</a:t>
-            </a:r>
-            <a:r>
-              <a:rPr lang="en-US" sz="1200" b="1" dirty="0">
-                <a:solidFill>
-                  <a:srgbClr val="EE9999"/>
-                </a:solidFill>
-                <a:latin typeface="Consolas" panose="020B0609020204030204" pitchFamily="49" charset="0"/>
-              </a:rPr>
-              <a:t>(</a:t>
-            </a:r>
-            <a:r>
-              <a:rPr lang="en-US" sz="1200" dirty="0" err="1">
-                <a:solidFill>
-                  <a:srgbClr val="000000"/>
-                </a:solidFill>
-                <a:latin typeface="Consolas" panose="020B0609020204030204" pitchFamily="49" charset="0"/>
-              </a:rPr>
-              <a:t>T</a:t>
-            </a:r>
-            <a:r>
-              <a:rPr lang="en-US" sz="1200" b="1" dirty="0" err="1">
-                <a:solidFill>
-                  <a:srgbClr val="EE9999"/>
-                </a:solidFill>
-                <a:latin typeface="Consolas" panose="020B0609020204030204" pitchFamily="49" charset="0"/>
-              </a:rPr>
-              <a:t>.</a:t>
-            </a:r>
-            <a:r>
-              <a:rPr lang="en-US" sz="1200" dirty="0" err="1">
-                <a:solidFill>
-                  <a:srgbClr val="000000"/>
-                </a:solidFill>
-                <a:latin typeface="Consolas" panose="020B0609020204030204" pitchFamily="49" charset="0"/>
-              </a:rPr>
-              <a:t>TrackID</a:t>
-            </a:r>
-            <a:r>
-              <a:rPr lang="en-US" sz="1200" b="1" dirty="0">
-                <a:solidFill>
-                  <a:srgbClr val="EE9999"/>
-                </a:solidFill>
-                <a:latin typeface="Consolas" panose="020B0609020204030204" pitchFamily="49" charset="0"/>
-              </a:rPr>
-              <a:t>) </a:t>
-            </a:r>
-            <a:r>
-              <a:rPr lang="en-US" sz="1200" dirty="0">
-                <a:solidFill>
-                  <a:srgbClr val="0000FF"/>
-                </a:solidFill>
-                <a:latin typeface="Consolas" panose="020B0609020204030204" pitchFamily="49" charset="0"/>
-              </a:rPr>
-              <a:t>as </a:t>
-            </a:r>
-            <a:r>
-              <a:rPr lang="en-US" sz="1200" dirty="0" err="1">
-                <a:solidFill>
-                  <a:srgbClr val="000000"/>
-                </a:solidFill>
-                <a:latin typeface="Consolas" panose="020B0609020204030204" pitchFamily="49" charset="0"/>
-              </a:rPr>
-              <a:t>numberTracks</a:t>
-            </a:r>
-            <a:r>
-              <a:rPr lang="en-US" sz="1200" dirty="0">
-                <a:solidFill>
-                  <a:srgbClr val="000000"/>
-                </a:solidFill>
-                <a:latin typeface="Consolas" panose="020B0609020204030204" pitchFamily="49" charset="0"/>
-              </a:rPr>
-              <a:t> </a:t>
-            </a:r>
-            <a:r>
-              <a:rPr lang="en-US" sz="1200" dirty="0">
-                <a:solidFill>
-                  <a:srgbClr val="6B8E23"/>
-                </a:solidFill>
-                <a:latin typeface="Consolas" panose="020B0609020204030204" pitchFamily="49" charset="0"/>
-              </a:rPr>
-              <a:t>--&lt;3&gt;</a:t>
-            </a:r>
-          </a:p>
-          <a:p>
-            <a:r>
-              <a:rPr lang="en-US" sz="1200" dirty="0">
-                <a:solidFill>
-                  <a:srgbClr val="0000FF"/>
-                </a:solidFill>
-                <a:latin typeface="Consolas" panose="020B0609020204030204" pitchFamily="49" charset="0"/>
-              </a:rPr>
-              <a:t>from </a:t>
-            </a:r>
-            <a:r>
-              <a:rPr lang="en-US" sz="1200" dirty="0">
-                <a:solidFill>
-                  <a:srgbClr val="000000"/>
-                </a:solidFill>
-                <a:latin typeface="Consolas" panose="020B0609020204030204" pitchFamily="49" charset="0"/>
-              </a:rPr>
-              <a:t>Genre G   </a:t>
+              <a:t>GenreID</a:t>
             </a:r>
           </a:p>
           <a:p>
@@ -9114,7 +9096,18 @@
                 </a:solidFill>
                 <a:latin typeface="Consolas" panose="020B0609020204030204" pitchFamily="49" charset="0"/>
               </a:rPr>
-              <a:t>left outer Join </a:t>
+              <a:t>Group by</a:t>
+            </a:r>
+          </a:p>
+          <a:p>
+            <a:r>
+              <a:rPr lang="en-US" sz="1200" dirty="0">
+                <a:solidFill>
+                  <a:srgbClr val="0000FF"/>
+                </a:solidFill>
+                <a:latin typeface="Consolas" panose="020B0609020204030204" pitchFamily="49" charset="0"/>
+              </a:rPr>
+              <a:t>	</a:t>
             </a:r>
             <a:r>
               <a:rPr lang="en-US" sz="1200" dirty="0">
@@ -9123,7 +9116,54 @@
                 </a:solidFill>
                 <a:latin typeface="Consolas" panose="020B0609020204030204" pitchFamily="49" charset="0"/>
               </a:rPr>
-              <a:t>Track T  </a:t>
+              <a:t>G</a:t>
+            </a:r>
+            <a:r>
+              <a:rPr lang="en-US" sz="1200" b="1" dirty="0">
+                <a:solidFill>
+                  <a:srgbClr val="EE9999"/>
+                </a:solidFill>
+                <a:latin typeface="Consolas" panose="020B0609020204030204" pitchFamily="49" charset="0"/>
+              </a:rPr>
+              <a:t>.</a:t>
+            </a:r>
+            <a:r>
+              <a:rPr lang="en-US" sz="1200" dirty="0">
+                <a:solidFill>
+                  <a:srgbClr val="000000"/>
+                </a:solidFill>
+                <a:latin typeface="Consolas" panose="020B0609020204030204" pitchFamily="49" charset="0"/>
+              </a:rPr>
+              <a:t>GenreID</a:t>
+            </a:r>
+          </a:p>
+          <a:p>
+            <a:r>
+              <a:rPr lang="en-US" sz="1200" dirty="0">
+                <a:solidFill>
+                  <a:srgbClr val="000000"/>
+                </a:solidFill>
+                <a:latin typeface="Consolas" panose="020B0609020204030204" pitchFamily="49" charset="0"/>
+              </a:rPr>
+              <a:t>	</a:t>
+            </a:r>
+            <a:r>
+              <a:rPr lang="en-US" sz="1200" b="1" dirty="0">
+                <a:solidFill>
+                  <a:srgbClr val="EE9999"/>
+                </a:solidFill>
+                <a:latin typeface="Consolas" panose="020B0609020204030204" pitchFamily="49" charset="0"/>
+              </a:rPr>
+              <a:t>,</a:t>
+            </a:r>
+            <a:r>
+              <a:rPr lang="en-US" sz="1200" dirty="0">
+                <a:solidFill>
+                  <a:srgbClr val="000000"/>
+                </a:solidFill>
+                <a:latin typeface="Consolas" panose="020B0609020204030204" pitchFamily="49" charset="0"/>
+              </a:rPr>
+              <a:t>genreName   </a:t>
             </a:r>
             <a:r>
               <a:rPr lang="en-US" sz="1200" dirty="0">
@@ -9132,30 +9172,269 @@
                 </a:solidFill>
                 <a:latin typeface="Consolas" panose="020B0609020204030204" pitchFamily="49" charset="0"/>
               </a:rPr>
-              <a:t>--&lt;6&gt;</a:t>
-            </a:r>
-          </a:p>
-          <a:p>
-            <a:r>
-              <a:rPr lang="nl-NL" sz="1200" dirty="0">
+              <a:t>--&lt;5&gt;</a:t>
+            </a:r>
+          </a:p>
+          <a:p>
+            <a:r>
+              <a:rPr lang="en-US" sz="1200" dirty="0">
                 <a:solidFill>
                   <a:srgbClr val="0000FF"/>
                 </a:solidFill>
                 <a:latin typeface="Consolas" panose="020B0609020204030204" pitchFamily="49" charset="0"/>
               </a:rPr>
-              <a:t>on </a:t>
-            </a:r>
-            <a:r>
-              <a:rPr lang="nl-NL" sz="1200" dirty="0">
+              <a:t>order by </a:t>
+            </a:r>
+          </a:p>
+          <a:p>
+            <a:r>
+              <a:rPr lang="en-US" sz="1200" dirty="0">
+                <a:solidFill>
+                  <a:srgbClr val="0000FF"/>
+                </a:solidFill>
+                <a:latin typeface="Consolas" panose="020B0609020204030204" pitchFamily="49" charset="0"/>
+              </a:rPr>
+              <a:t>	</a:t>
+            </a:r>
+            <a:r>
+              <a:rPr lang="en-US" sz="1200" dirty="0">
                 <a:solidFill>
                   <a:srgbClr val="000000"/>
                 </a:solidFill>
                 <a:latin typeface="Consolas" panose="020B0609020204030204" pitchFamily="49" charset="0"/>
               </a:rPr>
+              <a:t>genreName</a:t>
+            </a:r>
+            <a:r>
+              <a:rPr lang="en-US" sz="1200" dirty="0">
+                <a:solidFill>
+                  <a:srgbClr val="C0C0C0"/>
+                </a:solidFill>
+                <a:latin typeface="Consolas" panose="020B0609020204030204" pitchFamily="49" charset="0"/>
+              </a:rPr>
+              <a:t>;  </a:t>
+            </a:r>
+            <a:r>
+              <a:rPr lang="en-US" sz="1200" dirty="0">
+                <a:solidFill>
+                  <a:srgbClr val="6B8E23"/>
+                </a:solidFill>
+                <a:latin typeface="Consolas" panose="020B0609020204030204" pitchFamily="49" charset="0"/>
+              </a:rPr>
+              <a:t>--&lt;5&gt;		</a:t>
+            </a:r>
+            <a:endParaRPr lang="en-US" sz="3200" dirty="0"/>
+          </a:p>
+        </p:txBody>
+      </p:sp>
+      <p:sp>
+        <p:nvSpPr>
+          <p:cNvPr id="20" name="Rectangle 19">
+            <a:extLst>
+              <a:ext uri="{FF2B5EF4-FFF2-40B4-BE49-F238E27FC236}">
+                <a16:creationId xmlns:a16="http://schemas.microsoft.com/office/drawing/2014/main" id="{93260378-1265-498F-AFF0-6C23B77E31ED}"/>
+              </a:ext>
+            </a:extLst>
+          </p:cNvPr>
+          <p:cNvSpPr/>
+          <p:nvPr/>
+        </p:nvSpPr>
+        <p:spPr>
+          <a:xfrm>
+            <a:off x="5097122" y="790457"/>
+            <a:ext cx="5390299" cy="2954655"/>
+          </a:xfrm>
+          <a:prstGeom prst="rect">
+            <a:avLst/>
+          </a:prstGeom>
+        </p:spPr>
+        <p:txBody>
+          <a:bodyPr wrap="square">
+            <a:spAutoFit/>
+          </a:bodyPr>
+          <a:lstStyle/>
+          <a:p>
+            <a:r>
+              <a:rPr lang="en-US" sz="1200" dirty="0">
+                <a:solidFill>
+                  <a:srgbClr val="6B8E23"/>
+                </a:solidFill>
+                <a:latin typeface="Consolas" panose="020B0609020204030204" pitchFamily="49" charset="0"/>
+              </a:rPr>
+              <a:t>-- Track Count by Genre (Inner Join)  Left</a:t>
+            </a:r>
+          </a:p>
+          <a:p>
+            <a:r>
+              <a:rPr lang="en-US" sz="1200" dirty="0">
+                <a:solidFill>
+                  <a:srgbClr val="0000FF"/>
+                </a:solidFill>
+                <a:latin typeface="Consolas" panose="020B0609020204030204" pitchFamily="49" charset="0"/>
+              </a:rPr>
+              <a:t>Select</a:t>
+            </a:r>
+          </a:p>
+          <a:p>
+            <a:r>
+              <a:rPr lang="en-US" sz="1200" dirty="0">
+                <a:solidFill>
+                  <a:srgbClr val="0000FF"/>
+                </a:solidFill>
+                <a:latin typeface="Consolas" panose="020B0609020204030204" pitchFamily="49" charset="0"/>
+              </a:rPr>
+              <a:t>    </a:t>
+            </a:r>
+            <a:r>
+              <a:rPr lang="en-US" sz="1200" dirty="0">
+                <a:solidFill>
+                  <a:srgbClr val="000000"/>
+                </a:solidFill>
+                <a:latin typeface="Consolas" panose="020B0609020204030204" pitchFamily="49" charset="0"/>
+              </a:rPr>
+              <a:t>G</a:t>
+            </a:r>
+            <a:r>
+              <a:rPr lang="en-US" sz="1200" b="1" dirty="0">
+                <a:solidFill>
+                  <a:srgbClr val="EE9999"/>
+                </a:solidFill>
+                <a:latin typeface="Consolas" panose="020B0609020204030204" pitchFamily="49" charset="0"/>
+              </a:rPr>
+              <a:t>.</a:t>
+            </a:r>
+            <a:r>
+              <a:rPr lang="en-US" sz="1200" dirty="0">
+                <a:solidFill>
+                  <a:srgbClr val="000000"/>
+                </a:solidFill>
+                <a:latin typeface="Consolas" panose="020B0609020204030204" pitchFamily="49" charset="0"/>
+              </a:rPr>
+              <a:t>GenreID</a:t>
+            </a:r>
+          </a:p>
+          <a:p>
+            <a:r>
+              <a:rPr lang="en-US" sz="1200" dirty="0">
+                <a:solidFill>
+                  <a:srgbClr val="000000"/>
+                </a:solidFill>
+                <a:latin typeface="Consolas" panose="020B0609020204030204" pitchFamily="49" charset="0"/>
+              </a:rPr>
+              <a:t>    </a:t>
+            </a:r>
+            <a:r>
+              <a:rPr lang="en-US" sz="1200" b="1" dirty="0">
+                <a:solidFill>
+                  <a:srgbClr val="EE9999"/>
+                </a:solidFill>
+                <a:latin typeface="Consolas" panose="020B0609020204030204" pitchFamily="49" charset="0"/>
+              </a:rPr>
+              <a:t>,</a:t>
+            </a:r>
+            <a:r>
+              <a:rPr lang="en-US" sz="1200" dirty="0">
+                <a:solidFill>
+                  <a:srgbClr val="000000"/>
+                </a:solidFill>
+                <a:latin typeface="Consolas" panose="020B0609020204030204" pitchFamily="49" charset="0"/>
+              </a:rPr>
+              <a:t>G</a:t>
+            </a:r>
+            <a:r>
+              <a:rPr lang="en-US" sz="1200" b="1" dirty="0">
+                <a:solidFill>
+                  <a:srgbClr val="EE9999"/>
+                </a:solidFill>
+                <a:latin typeface="Consolas" panose="020B0609020204030204" pitchFamily="49" charset="0"/>
+              </a:rPr>
+              <a:t>.</a:t>
+            </a:r>
+            <a:r>
+              <a:rPr lang="en-US" sz="1200" dirty="0">
+                <a:solidFill>
+                  <a:srgbClr val="000000"/>
+                </a:solidFill>
+                <a:latin typeface="Consolas" panose="020B0609020204030204" pitchFamily="49" charset="0"/>
+              </a:rPr>
+              <a:t>Name </a:t>
+            </a:r>
+            <a:r>
+              <a:rPr lang="en-US" sz="1200" dirty="0">
+                <a:solidFill>
+                  <a:srgbClr val="0000FF"/>
+                </a:solidFill>
+                <a:latin typeface="Consolas" panose="020B0609020204030204" pitchFamily="49" charset="0"/>
+              </a:rPr>
+              <a:t>as </a:t>
+            </a:r>
+            <a:r>
+              <a:rPr lang="en-US" sz="1200" dirty="0">
+                <a:solidFill>
+                  <a:srgbClr val="000000"/>
+                </a:solidFill>
+                <a:latin typeface="Consolas" panose="020B0609020204030204" pitchFamily="49" charset="0"/>
+              </a:rPr>
+              <a:t>genreName  </a:t>
+            </a:r>
+            <a:r>
+              <a:rPr lang="en-US" sz="1200" dirty="0">
+                <a:solidFill>
+                  <a:srgbClr val="6B8E23"/>
+                </a:solidFill>
+                <a:latin typeface="Consolas" panose="020B0609020204030204" pitchFamily="49" charset="0"/>
+              </a:rPr>
+              <a:t>--&lt;1&gt;    </a:t>
+            </a:r>
+          </a:p>
+          <a:p>
+            <a:r>
+              <a:rPr lang="en-US" sz="1200" dirty="0">
+                <a:solidFill>
+                  <a:srgbClr val="6B8E23"/>
+                </a:solidFill>
+                <a:latin typeface="Consolas" panose="020B0609020204030204" pitchFamily="49" charset="0"/>
+              </a:rPr>
+              <a:t>    </a:t>
+            </a:r>
+            <a:r>
+              <a:rPr lang="en-US" sz="1200" b="1" dirty="0">
+                <a:solidFill>
+                  <a:srgbClr val="EE9999"/>
+                </a:solidFill>
+                <a:latin typeface="Consolas" panose="020B0609020204030204" pitchFamily="49" charset="0"/>
+              </a:rPr>
+              <a:t>,</a:t>
+            </a:r>
+            <a:r>
+              <a:rPr lang="en-US" sz="1200" dirty="0">
+                <a:solidFill>
+                  <a:srgbClr val="0000FF"/>
+                </a:solidFill>
+                <a:latin typeface="Consolas" panose="020B0609020204030204" pitchFamily="49" charset="0"/>
+              </a:rPr>
+              <a:t>count</a:t>
+            </a:r>
+            <a:r>
+              <a:rPr lang="en-US" sz="1200" b="1" dirty="0">
+                <a:solidFill>
+                  <a:srgbClr val="EE9999"/>
+                </a:solidFill>
+                <a:latin typeface="Consolas" panose="020B0609020204030204" pitchFamily="49" charset="0"/>
+              </a:rPr>
+              <a:t>(</a:t>
+            </a:r>
+            <a:r>
+              <a:rPr lang="en-US" sz="1200" dirty="0">
+                <a:solidFill>
+                  <a:srgbClr val="000000"/>
+                </a:solidFill>
+                <a:latin typeface="Consolas" panose="020B0609020204030204" pitchFamily="49" charset="0"/>
+              </a:rPr>
               <a:t>T</a:t>
             </a:r>
             <a:r>
-              <a:rPr lang="nl-NL" sz="1200" b="1" dirty="0">
+              <a:rPr lang="en-US" sz="1200" b="1" dirty="0">
                 <a:solidFill>
                   <a:srgbClr val="EE9999"/>
                 </a:solidFill>
@@ -9164,49 +9443,69 @@
               <a:t>.</a:t>
             </a:r>
             <a:r>
-              <a:rPr lang="nl-NL" sz="1200" dirty="0">
+              <a:rPr lang="en-US" sz="1200" dirty="0">
                 <a:solidFill>
                   <a:srgbClr val="000000"/>
                 </a:solidFill>
                 <a:latin typeface="Consolas" panose="020B0609020204030204" pitchFamily="49" charset="0"/>
               </a:rPr>
-              <a:t>GenreID </a:t>
-            </a:r>
-            <a:r>
-              <a:rPr lang="nl-NL" sz="1200" b="1" dirty="0">
+              <a:t>TrackID</a:t>
+            </a:r>
+            <a:r>
+              <a:rPr lang="en-US" sz="1200" b="1" dirty="0">
                 <a:solidFill>
                   <a:srgbClr val="EE9999"/>
                 </a:solidFill>
                 <a:latin typeface="Consolas" panose="020B0609020204030204" pitchFamily="49" charset="0"/>
               </a:rPr>
-              <a:t>= </a:t>
-            </a:r>
-            <a:r>
-              <a:rPr lang="nl-NL" sz="1200" dirty="0">
+              <a:t>) </a:t>
+            </a:r>
+            <a:r>
+              <a:rPr lang="en-US" sz="1200" dirty="0">
+                <a:solidFill>
+                  <a:srgbClr val="0000FF"/>
+                </a:solidFill>
+                <a:latin typeface="Consolas" panose="020B0609020204030204" pitchFamily="49" charset="0"/>
+              </a:rPr>
+              <a:t>as </a:t>
+            </a:r>
+            <a:r>
+              <a:rPr lang="en-US" sz="1200" dirty="0">
                 <a:solidFill>
                   <a:srgbClr val="000000"/>
                 </a:solidFill>
                 <a:latin typeface="Consolas" panose="020B0609020204030204" pitchFamily="49" charset="0"/>
               </a:rPr>
-              <a:t>G</a:t>
-            </a:r>
-            <a:r>
-              <a:rPr lang="nl-NL" sz="1200" b="1" dirty="0">
-                <a:solidFill>
-                  <a:srgbClr val="EE9999"/>
-                </a:solidFill>
-                <a:latin typeface="Consolas" panose="020B0609020204030204" pitchFamily="49" charset="0"/>
-              </a:rPr>
-              <a:t>.</a:t>
-            </a:r>
-            <a:r>
-              <a:rPr lang="nl-NL" sz="1200" dirty="0">
+              <a:t>numberTracks </a:t>
+            </a:r>
+            <a:r>
+              <a:rPr lang="en-US" sz="1200" dirty="0">
+                <a:solidFill>
+                  <a:srgbClr val="6B8E23"/>
+                </a:solidFill>
+                <a:latin typeface="Consolas" panose="020B0609020204030204" pitchFamily="49" charset="0"/>
+              </a:rPr>
+              <a:t>--&lt;3&gt;</a:t>
+            </a:r>
+          </a:p>
+          <a:p>
+            <a:r>
+              <a:rPr lang="en-US" sz="1200" dirty="0">
+                <a:solidFill>
+                  <a:srgbClr val="0000FF"/>
+                </a:solidFill>
+                <a:latin typeface="Consolas" panose="020B0609020204030204" pitchFamily="49" charset="0"/>
+              </a:rPr>
+              <a:t>from </a:t>
+            </a:r>
+            <a:r>
+              <a:rPr lang="en-US" sz="1200" dirty="0">
                 <a:solidFill>
                   <a:srgbClr val="000000"/>
                 </a:solidFill>
                 <a:latin typeface="Consolas" panose="020B0609020204030204" pitchFamily="49" charset="0"/>
               </a:rPr>
-              <a:t>GenreID</a:t>
+              <a:t>Genre G   </a:t>
             </a:r>
           </a:p>
           <a:p>
@@ -9219,16 +9518,14 @@
           </a:p>
           <a:p>
             <a:r>
-              <a:rPr lang="en-US" sz="1200" dirty="0">
+              <a:rPr lang="en-US" b="1" dirty="0">
                 <a:solidFill>
                   <a:srgbClr val="0000FF"/>
                 </a:solidFill>
                 <a:latin typeface="Consolas" panose="020B0609020204030204" pitchFamily="49" charset="0"/>
               </a:rPr>
-              <a:t>Group by</a:t>
-            </a:r>
-          </a:p>
-          <a:p>
+              <a:t>left</a:t>
+            </a:r>
             <a:r>
               <a:rPr lang="en-US" sz="1200" dirty="0">
                 <a:solidFill>
@@ -9236,19 +9533,84 @@
                 </a:solidFill>
                 <a:latin typeface="Consolas" panose="020B0609020204030204" pitchFamily="49" charset="0"/>
               </a:rPr>
-              <a:t>	</a:t>
-            </a:r>
-            <a:r>
-              <a:rPr lang="en-US" sz="1200" dirty="0" err="1">
+              <a:t> outer Join </a:t>
+            </a:r>
+            <a:r>
+              <a:rPr lang="en-US" sz="1200" dirty="0">
                 <a:solidFill>
                   <a:srgbClr val="000000"/>
                 </a:solidFill>
                 <a:latin typeface="Consolas" panose="020B0609020204030204" pitchFamily="49" charset="0"/>
               </a:rPr>
+              <a:t>Track T  </a:t>
+            </a:r>
+            <a:r>
+              <a:rPr lang="en-US" sz="1200" dirty="0">
+                <a:solidFill>
+                  <a:srgbClr val="6B8E23"/>
+                </a:solidFill>
+                <a:latin typeface="Consolas" panose="020B0609020204030204" pitchFamily="49" charset="0"/>
+              </a:rPr>
+              <a:t>--&lt;6&gt;</a:t>
+            </a:r>
+          </a:p>
+          <a:p>
+            <a:r>
+              <a:rPr lang="nl-NL" sz="1200" dirty="0">
+                <a:solidFill>
+                  <a:srgbClr val="0000FF"/>
+                </a:solidFill>
+                <a:latin typeface="Consolas" panose="020B0609020204030204" pitchFamily="49" charset="0"/>
+              </a:rPr>
+              <a:t>on </a:t>
+            </a:r>
+            <a:r>
+              <a:rPr lang="nl-NL" sz="1200" dirty="0">
+                <a:solidFill>
+                  <a:srgbClr val="000000"/>
+                </a:solidFill>
+                <a:latin typeface="Consolas" panose="020B0609020204030204" pitchFamily="49" charset="0"/>
+              </a:rPr>
+              <a:t>T</a:t>
+            </a:r>
+            <a:r>
+              <a:rPr lang="nl-NL" sz="1200" b="1" dirty="0">
+                <a:solidFill>
+                  <a:srgbClr val="EE9999"/>
+                </a:solidFill>
+                <a:latin typeface="Consolas" panose="020B0609020204030204" pitchFamily="49" charset="0"/>
+              </a:rPr>
+              <a:t>.</a:t>
+            </a:r>
+            <a:r>
+              <a:rPr lang="nl-NL" sz="1200" dirty="0">
+                <a:solidFill>
+                  <a:srgbClr val="000000"/>
+                </a:solidFill>
+                <a:latin typeface="Consolas" panose="020B0609020204030204" pitchFamily="49" charset="0"/>
+              </a:rPr>
+              <a:t>GenreID </a:t>
+            </a:r>
+            <a:r>
+              <a:rPr lang="nl-NL" sz="1200" b="1" dirty="0">
+                <a:solidFill>
+                  <a:srgbClr val="EE9999"/>
+                </a:solidFill>
+                <a:latin typeface="Consolas" panose="020B0609020204030204" pitchFamily="49" charset="0"/>
+              </a:rPr>
+              <a:t>= </a:t>
+            </a:r>
+            <a:r>
+              <a:rPr lang="nl-NL" sz="1200" dirty="0">
+                <a:solidFill>
+                  <a:srgbClr val="000000"/>
+                </a:solidFill>
+                <a:latin typeface="Consolas" panose="020B0609020204030204" pitchFamily="49" charset="0"/>
+              </a:rPr>
               <a:t>G</a:t>
             </a:r>
             <a:r>
-              <a:rPr lang="en-US" sz="1200" b="1" dirty="0" err="1">
+              <a:rPr lang="nl-NL" sz="1200" b="1" dirty="0">
                 <a:solidFill>
                   <a:srgbClr val="EE9999"/>
                 </a:solidFill>
@@ -9257,7 +9619,7 @@
               <a:t>.</a:t>
             </a:r>
             <a:r>
-              <a:rPr lang="en-US" sz="1200" dirty="0" err="1">
+              <a:rPr lang="nl-NL" sz="1200" dirty="0">
                 <a:solidFill>
                   <a:srgbClr val="000000"/>
                 </a:solidFill>
@@ -9265,6 +9627,8 @@
               </a:rPr>
               <a:t>GenreID</a:t>
             </a:r>
+          </a:p>
+          <a:p>
             <a:endParaRPr lang="en-US" sz="1200" dirty="0">
               <a:solidFill>
                 <a:srgbClr val="000000"/>
@@ -9276,10 +9640,59 @@
             <a:r>
               <a:rPr lang="en-US" sz="1200" dirty="0">
                 <a:solidFill>
+                  <a:srgbClr val="0000FF"/>
+                </a:solidFill>
+                <a:latin typeface="Consolas" panose="020B0609020204030204" pitchFamily="49" charset="0"/>
+              </a:rPr>
+              <a:t>Group by</a:t>
+            </a:r>
+          </a:p>
+          <a:p>
+            <a:r>
+              <a:rPr lang="en-US" sz="1200" dirty="0">
+                <a:solidFill>
+                  <a:srgbClr val="0000FF"/>
+                </a:solidFill>
+                <a:latin typeface="Consolas" panose="020B0609020204030204" pitchFamily="49" charset="0"/>
+              </a:rPr>
+              <a:t>	</a:t>
+            </a:r>
+            <a:r>
+              <a:rPr lang="en-US" sz="1200" dirty="0">
+                <a:solidFill>
                   <a:srgbClr val="000000"/>
                 </a:solidFill>
                 <a:latin typeface="Consolas" panose="020B0609020204030204" pitchFamily="49" charset="0"/>
               </a:rPr>
+              <a:t>G</a:t>
+            </a:r>
+            <a:r>
+              <a:rPr lang="en-US" sz="1200" b="1" dirty="0">
+                <a:solidFill>
+                  <a:srgbClr val="EE9999"/>
+                </a:solidFill>
+                <a:latin typeface="Consolas" panose="020B0609020204030204" pitchFamily="49" charset="0"/>
+              </a:rPr>
+              <a:t>.</a:t>
+            </a:r>
+            <a:r>
+              <a:rPr lang="en-US" sz="1200" dirty="0">
+                <a:solidFill>
+                  <a:srgbClr val="000000"/>
+                </a:solidFill>
+                <a:latin typeface="Consolas" panose="020B0609020204030204" pitchFamily="49" charset="0"/>
+              </a:rPr>
+              <a:t>GenreID</a:t>
+            </a:r>
+          </a:p>
+          <a:p>
+            <a:r>
+              <a:rPr lang="en-US" sz="1200" dirty="0">
+                <a:solidFill>
+                  <a:srgbClr val="000000"/>
+                </a:solidFill>
+                <a:latin typeface="Consolas" panose="020B0609020204030204" pitchFamily="49" charset="0"/>
+              </a:rPr>
               <a:t>	</a:t>
             </a:r>
             <a:r>
@@ -9292,22 +9705,62 @@
               <a:t>,</a:t>
             </a:r>
             <a:r>
-              <a:rPr lang="en-US" sz="1200" dirty="0" err="1">
+              <a:rPr lang="en-US" sz="1200" dirty="0">
                 <a:solidFill>
                   <a:srgbClr val="000000"/>
                 </a:solidFill>
                 <a:latin typeface="Consolas" panose="020B0609020204030204" pitchFamily="49" charset="0"/>
               </a:rPr>
+              <a:t>genreName   </a:t>
+            </a:r>
+            <a:r>
+              <a:rPr lang="en-US" sz="1200" dirty="0">
+                <a:solidFill>
+                  <a:srgbClr val="6B8E23"/>
+                </a:solidFill>
+                <a:latin typeface="Consolas" panose="020B0609020204030204" pitchFamily="49" charset="0"/>
+              </a:rPr>
+              <a:t>--&lt;5&gt;</a:t>
+            </a:r>
+          </a:p>
+          <a:p>
+            <a:r>
+              <a:rPr lang="en-US" sz="1200" dirty="0">
+                <a:solidFill>
+                  <a:srgbClr val="0000FF"/>
+                </a:solidFill>
+                <a:latin typeface="Consolas" panose="020B0609020204030204" pitchFamily="49" charset="0"/>
+              </a:rPr>
+              <a:t>order by </a:t>
+            </a:r>
+          </a:p>
+          <a:p>
+            <a:r>
+              <a:rPr lang="en-US" sz="1200" dirty="0">
+                <a:solidFill>
+                  <a:srgbClr val="0000FF"/>
+                </a:solidFill>
+                <a:latin typeface="Consolas" panose="020B0609020204030204" pitchFamily="49" charset="0"/>
+              </a:rPr>
+              <a:t>	</a:t>
+            </a:r>
+            <a:r>
+              <a:rPr lang="en-US" sz="1200" dirty="0">
+                <a:solidFill>
+                  <a:srgbClr val="000000"/>
+                </a:solidFill>
+                <a:latin typeface="Consolas" panose="020B0609020204030204" pitchFamily="49" charset="0"/>
+              </a:rPr>
               <a:t>genreName</a:t>
             </a:r>
             <a:r>
               <a:rPr lang="en-US" sz="1200" dirty="0">
                 <a:solidFill>
-                  <a:srgbClr val="000000"/>
-                </a:solidFill>
-                <a:latin typeface="Consolas" panose="020B0609020204030204" pitchFamily="49" charset="0"/>
-              </a:rPr>
-              <a:t>   </a:t>
+                  <a:srgbClr val="C0C0C0"/>
+                </a:solidFill>
+                <a:latin typeface="Consolas" panose="020B0609020204030204" pitchFamily="49" charset="0"/>
+              </a:rPr>
+              <a:t>;  </a:t>
             </a:r>
             <a:r>
               <a:rPr lang="en-US" sz="1200" dirty="0">
@@ -9316,55 +9769,6 @@
                 </a:solidFill>
                 <a:latin typeface="Consolas" panose="020B0609020204030204" pitchFamily="49" charset="0"/>
               </a:rPr>
-              <a:t>--&lt;5&gt;</a:t>
-            </a:r>
-          </a:p>
-          <a:p>
-            <a:r>
-              <a:rPr lang="en-US" sz="1200" dirty="0">
-                <a:solidFill>
-                  <a:srgbClr val="0000FF"/>
-                </a:solidFill>
-                <a:latin typeface="Consolas" panose="020B0609020204030204" pitchFamily="49" charset="0"/>
-              </a:rPr>
-              <a:t>order by </a:t>
-            </a:r>
-          </a:p>
-          <a:p>
-            <a:r>
-              <a:rPr lang="en-US" sz="1200" dirty="0">
-                <a:solidFill>
-                  <a:srgbClr val="0000FF"/>
-                </a:solidFill>
-                <a:latin typeface="Consolas" panose="020B0609020204030204" pitchFamily="49" charset="0"/>
-              </a:rPr>
-              <a:t>	</a:t>
-            </a:r>
-            <a:r>
-              <a:rPr lang="en-US" sz="1200" dirty="0" err="1">
-                <a:solidFill>
-                  <a:srgbClr val="000000"/>
-                </a:solidFill>
-                <a:latin typeface="Consolas" panose="020B0609020204030204" pitchFamily="49" charset="0"/>
-              </a:rPr>
-              <a:t>genreName</a:t>
-            </a:r>
-            <a:r>
-              <a:rPr lang="en-US" sz="1200" dirty="0">
-                <a:solidFill>
-                  <a:srgbClr val="C0C0C0"/>
-                </a:solidFill>
-                <a:latin typeface="Consolas" panose="020B0609020204030204" pitchFamily="49" charset="0"/>
-              </a:rPr>
-              <a:t>;  </a:t>
-            </a:r>
-            <a:r>
-              <a:rPr lang="en-US" sz="1200" dirty="0">
-                <a:solidFill>
-                  <a:srgbClr val="6B8E23"/>
-                </a:solidFill>
-                <a:latin typeface="Consolas" panose="020B0609020204030204" pitchFamily="49" charset="0"/>
-              </a:rPr>
               <a:t>--&lt;5&gt;		</a:t>
             </a:r>
             <a:endParaRPr lang="en-US" sz="3200" dirty="0"/>
@@ -9373,10 +9777,10 @@
       </p:sp>
       <p:sp>
         <p:nvSpPr>
-          <p:cNvPr id="20" name="Rectangle 19">
-            <a:extLst>
-              <a:ext uri="{FF2B5EF4-FFF2-40B4-BE49-F238E27FC236}">
-                <a16:creationId xmlns:a16="http://schemas.microsoft.com/office/drawing/2014/main" id="{93260378-1265-498F-AFF0-6C23B77E31ED}"/>
+          <p:cNvPr id="16" name="Rectangle 15">
+            <a:extLst>
+              <a:ext uri="{FF2B5EF4-FFF2-40B4-BE49-F238E27FC236}">
+                <a16:creationId xmlns:a16="http://schemas.microsoft.com/office/drawing/2014/main" id="{72A2DFEA-EAE7-4EC6-8663-58AA96F51D52}"/>
               </a:ext>
             </a:extLst>
           </p:cNvPr>
@@ -9385,585 +9789,108 @@
         </p:nvSpPr>
         <p:spPr>
           <a:xfrm>
-            <a:off x="5097122" y="790457"/>
-            <a:ext cx="5390299" cy="2954655"/>
+            <a:off x="1665627" y="3889788"/>
+            <a:ext cx="1069675" cy="431320"/>
           </a:xfrm>
           <a:prstGeom prst="rect">
             <a:avLst/>
           </a:prstGeom>
-        </p:spPr>
-        <p:txBody>
-          <a:bodyPr wrap="square">
-            <a:spAutoFit/>
-          </a:bodyPr>
-          <a:lstStyle/>
-          <a:p>
-            <a:r>
-              <a:rPr lang="en-US" sz="1200" dirty="0">
-                <a:solidFill>
-                  <a:srgbClr val="6B8E23"/>
-                </a:solidFill>
-                <a:latin typeface="Consolas" panose="020B0609020204030204" pitchFamily="49" charset="0"/>
-              </a:rPr>
-              <a:t>-- Track Count by Genre (Inner Join)  Left</a:t>
-            </a:r>
-          </a:p>
-          <a:p>
-            <a:r>
-              <a:rPr lang="en-US" sz="1200" dirty="0">
-                <a:solidFill>
-                  <a:srgbClr val="0000FF"/>
-                </a:solidFill>
-                <a:latin typeface="Consolas" panose="020B0609020204030204" pitchFamily="49" charset="0"/>
-              </a:rPr>
-              <a:t>Select</a:t>
-            </a:r>
-          </a:p>
-          <a:p>
-            <a:r>
-              <a:rPr lang="en-US" sz="1200" dirty="0">
-                <a:solidFill>
-                  <a:srgbClr val="0000FF"/>
-                </a:solidFill>
-                <a:latin typeface="Consolas" panose="020B0609020204030204" pitchFamily="49" charset="0"/>
-              </a:rPr>
-              <a:t>    </a:t>
-            </a:r>
-            <a:r>
-              <a:rPr lang="en-US" sz="1200" dirty="0" err="1">
-                <a:solidFill>
-                  <a:srgbClr val="000000"/>
-                </a:solidFill>
-                <a:latin typeface="Consolas" panose="020B0609020204030204" pitchFamily="49" charset="0"/>
+          <a:effectLst>
+            <a:outerShdw blurRad="50800" dist="38100" dir="2700000" algn="tl" rotWithShape="0">
+              <a:prstClr val="black">
+                <a:alpha val="40000"/>
+              </a:prstClr>
+            </a:outerShdw>
+          </a:effectLst>
+        </p:spPr>
+        <p:style>
+          <a:lnRef idx="2">
+            <a:schemeClr val="accent1">
+              <a:shade val="50000"/>
+            </a:schemeClr>
+          </a:lnRef>
+          <a:fillRef idx="1">
+            <a:schemeClr val="accent1"/>
+          </a:fillRef>
+          <a:effectRef idx="0">
+            <a:schemeClr val="accent1"/>
+          </a:effectRef>
+          <a:fontRef idx="minor">
+            <a:schemeClr val="lt1"/>
+          </a:fontRef>
+        </p:style>
+        <p:txBody>
+          <a:bodyPr rtlCol="0" anchor="ctr"/>
+          <a:lstStyle/>
+          <a:p>
+            <a:pPr algn="ctr"/>
+            <a:r>
+              <a:rPr lang="en-US" dirty="0"/>
+              <a:t>Genre</a:t>
+            </a:r>
+          </a:p>
+        </p:txBody>
+      </p:sp>
+      <p:sp>
+        <p:nvSpPr>
+          <p:cNvPr id="17" name="Rectangle 16">
+            <a:extLst>
+              <a:ext uri="{FF2B5EF4-FFF2-40B4-BE49-F238E27FC236}">
+                <a16:creationId xmlns:a16="http://schemas.microsoft.com/office/drawing/2014/main" id="{07D83095-394C-46B5-9A9A-2F7149FEC7A7}"/>
+              </a:ext>
+            </a:extLst>
+          </p:cNvPr>
+          <p:cNvSpPr/>
+          <p:nvPr/>
+        </p:nvSpPr>
+        <p:spPr>
+          <a:xfrm>
+            <a:off x="2611815" y="4245144"/>
+            <a:ext cx="408215" cy="263951"/>
+          </a:xfrm>
+          <a:prstGeom prst="rect">
+            <a:avLst/>
+          </a:prstGeom>
+          <a:solidFill>
+            <a:schemeClr val="accent6"/>
+          </a:solidFill>
+          <a:effectLst>
+            <a:outerShdw blurRad="50800" dist="38100" dir="2700000" algn="tl" rotWithShape="0">
+              <a:prstClr val="black">
+                <a:alpha val="40000"/>
+              </a:prstClr>
+            </a:outerShdw>
+          </a:effectLst>
+        </p:spPr>
+        <p:style>
+          <a:lnRef idx="2">
+            <a:schemeClr val="accent1">
+              <a:shade val="50000"/>
+            </a:schemeClr>
+          </a:lnRef>
+          <a:fillRef idx="1">
+            <a:schemeClr val="accent1"/>
+          </a:fillRef>
+          <a:effectRef idx="0">
+            <a:schemeClr val="accent1"/>
+          </a:effectRef>
+          <a:fontRef idx="minor">
+            <a:schemeClr val="lt1"/>
+          </a:fontRef>
+        </p:style>
+        <p:txBody>
+          <a:bodyPr rtlCol="0" anchor="ctr"/>
+          <a:lstStyle/>
+          <a:p>
+            <a:pPr algn="ctr"/>
+            <a:r>
+              <a:rPr lang="en-US" sz="1100" b="1" dirty="0">
+                <a:solidFill>
+                  <a:srgbClr val="FFFF00"/>
+                </a:solidFill>
               </a:rPr>
               <a:t>G</a:t>
             </a:r>
-            <a:r>
-              <a:rPr lang="en-US" sz="1200" b="1" dirty="0" err="1">
-                <a:solidFill>
-                  <a:srgbClr val="EE9999"/>
-                </a:solidFill>
-                <a:latin typeface="Consolas" panose="020B0609020204030204" pitchFamily="49" charset="0"/>
-              </a:rPr>
-              <a:t>.</a:t>
-            </a:r>
-            <a:r>
-              <a:rPr lang="en-US" sz="1200" dirty="0" err="1">
-                <a:solidFill>
-                  <a:srgbClr val="000000"/>
-                </a:solidFill>
-                <a:latin typeface="Consolas" panose="020B0609020204030204" pitchFamily="49" charset="0"/>
-              </a:rPr>
-              <a:t>GenreID</a:t>
-            </a:r>
-            <a:endParaRPr lang="en-US" sz="1200" dirty="0">
-              <a:solidFill>
-                <a:srgbClr val="000000"/>
-              </a:solidFill>
-              <a:latin typeface="Consolas" panose="020B0609020204030204" pitchFamily="49" charset="0"/>
-            </a:endParaRPr>
-          </a:p>
-          <a:p>
-            <a:r>
-              <a:rPr lang="en-US" sz="1200" dirty="0">
-                <a:solidFill>
-                  <a:srgbClr val="000000"/>
-                </a:solidFill>
-                <a:latin typeface="Consolas" panose="020B0609020204030204" pitchFamily="49" charset="0"/>
-              </a:rPr>
-              <a:t>    </a:t>
-            </a:r>
-            <a:r>
-              <a:rPr lang="en-US" sz="1200" b="1" dirty="0">
-                <a:solidFill>
-                  <a:srgbClr val="EE9999"/>
-                </a:solidFill>
-                <a:latin typeface="Consolas" panose="020B0609020204030204" pitchFamily="49" charset="0"/>
-              </a:rPr>
-              <a:t>,</a:t>
-            </a:r>
-            <a:r>
-              <a:rPr lang="en-US" sz="1200" dirty="0" err="1">
-                <a:solidFill>
-                  <a:srgbClr val="000000"/>
-                </a:solidFill>
-                <a:latin typeface="Consolas" panose="020B0609020204030204" pitchFamily="49" charset="0"/>
-              </a:rPr>
-              <a:t>G</a:t>
-            </a:r>
-            <a:r>
-              <a:rPr lang="en-US" sz="1200" b="1" dirty="0" err="1">
-                <a:solidFill>
-                  <a:srgbClr val="EE9999"/>
-                </a:solidFill>
-                <a:latin typeface="Consolas" panose="020B0609020204030204" pitchFamily="49" charset="0"/>
-              </a:rPr>
-              <a:t>.</a:t>
-            </a:r>
-            <a:r>
-              <a:rPr lang="en-US" sz="1200" dirty="0" err="1">
-                <a:solidFill>
-                  <a:srgbClr val="000000"/>
-                </a:solidFill>
-                <a:latin typeface="Consolas" panose="020B0609020204030204" pitchFamily="49" charset="0"/>
-              </a:rPr>
-              <a:t>Name</a:t>
-            </a:r>
-            <a:r>
-              <a:rPr lang="en-US" sz="1200" dirty="0">
-                <a:solidFill>
-                  <a:srgbClr val="000000"/>
-                </a:solidFill>
-                <a:latin typeface="Consolas" panose="020B0609020204030204" pitchFamily="49" charset="0"/>
-              </a:rPr>
-              <a:t> </a:t>
-            </a:r>
-            <a:r>
-              <a:rPr lang="en-US" sz="1200" dirty="0">
-                <a:solidFill>
-                  <a:srgbClr val="0000FF"/>
-                </a:solidFill>
-                <a:latin typeface="Consolas" panose="020B0609020204030204" pitchFamily="49" charset="0"/>
-              </a:rPr>
-              <a:t>as </a:t>
-            </a:r>
-            <a:r>
-              <a:rPr lang="en-US" sz="1200" dirty="0" err="1">
-                <a:solidFill>
-                  <a:srgbClr val="000000"/>
-                </a:solidFill>
-                <a:latin typeface="Consolas" panose="020B0609020204030204" pitchFamily="49" charset="0"/>
-              </a:rPr>
-              <a:t>genreName</a:t>
-            </a:r>
-            <a:r>
-              <a:rPr lang="en-US" sz="1200" dirty="0">
-                <a:solidFill>
-                  <a:srgbClr val="000000"/>
-                </a:solidFill>
-                <a:latin typeface="Consolas" panose="020B0609020204030204" pitchFamily="49" charset="0"/>
-              </a:rPr>
-              <a:t>  </a:t>
-            </a:r>
-            <a:r>
-              <a:rPr lang="en-US" sz="1200" dirty="0">
-                <a:solidFill>
-                  <a:srgbClr val="6B8E23"/>
-                </a:solidFill>
-                <a:latin typeface="Consolas" panose="020B0609020204030204" pitchFamily="49" charset="0"/>
-              </a:rPr>
-              <a:t>--&lt;1&gt;    </a:t>
-            </a:r>
-          </a:p>
-          <a:p>
-            <a:r>
-              <a:rPr lang="en-US" sz="1200" dirty="0">
-                <a:solidFill>
-                  <a:srgbClr val="6B8E23"/>
-                </a:solidFill>
-                <a:latin typeface="Consolas" panose="020B0609020204030204" pitchFamily="49" charset="0"/>
-              </a:rPr>
-              <a:t>    </a:t>
-            </a:r>
-            <a:r>
-              <a:rPr lang="en-US" sz="1200" b="1" dirty="0">
-                <a:solidFill>
-                  <a:srgbClr val="EE9999"/>
-                </a:solidFill>
-                <a:latin typeface="Consolas" panose="020B0609020204030204" pitchFamily="49" charset="0"/>
-              </a:rPr>
-              <a:t>,</a:t>
-            </a:r>
-            <a:r>
-              <a:rPr lang="en-US" sz="1200" dirty="0">
-                <a:solidFill>
-                  <a:srgbClr val="0000FF"/>
-                </a:solidFill>
-                <a:latin typeface="Consolas" panose="020B0609020204030204" pitchFamily="49" charset="0"/>
-              </a:rPr>
-              <a:t>count</a:t>
-            </a:r>
-            <a:r>
-              <a:rPr lang="en-US" sz="1200" b="1" dirty="0">
-                <a:solidFill>
-                  <a:srgbClr val="EE9999"/>
-                </a:solidFill>
-                <a:latin typeface="Consolas" panose="020B0609020204030204" pitchFamily="49" charset="0"/>
-              </a:rPr>
-              <a:t>(</a:t>
-            </a:r>
-            <a:r>
-              <a:rPr lang="en-US" sz="1200" dirty="0" err="1">
-                <a:solidFill>
-                  <a:srgbClr val="000000"/>
-                </a:solidFill>
-                <a:latin typeface="Consolas" panose="020B0609020204030204" pitchFamily="49" charset="0"/>
-              </a:rPr>
-              <a:t>T</a:t>
-            </a:r>
-            <a:r>
-              <a:rPr lang="en-US" sz="1200" b="1" dirty="0" err="1">
-                <a:solidFill>
-                  <a:srgbClr val="EE9999"/>
-                </a:solidFill>
-                <a:latin typeface="Consolas" panose="020B0609020204030204" pitchFamily="49" charset="0"/>
-              </a:rPr>
-              <a:t>.</a:t>
-            </a:r>
-            <a:r>
-              <a:rPr lang="en-US" sz="1200" dirty="0" err="1">
-                <a:solidFill>
-                  <a:srgbClr val="000000"/>
-                </a:solidFill>
-                <a:latin typeface="Consolas" panose="020B0609020204030204" pitchFamily="49" charset="0"/>
-              </a:rPr>
-              <a:t>TrackID</a:t>
-            </a:r>
-            <a:r>
-              <a:rPr lang="en-US" sz="1200" b="1" dirty="0">
-                <a:solidFill>
-                  <a:srgbClr val="EE9999"/>
-                </a:solidFill>
-                <a:latin typeface="Consolas" panose="020B0609020204030204" pitchFamily="49" charset="0"/>
-              </a:rPr>
-              <a:t>) </a:t>
-            </a:r>
-            <a:r>
-              <a:rPr lang="en-US" sz="1200" dirty="0">
-                <a:solidFill>
-                  <a:srgbClr val="0000FF"/>
-                </a:solidFill>
-                <a:latin typeface="Consolas" panose="020B0609020204030204" pitchFamily="49" charset="0"/>
-              </a:rPr>
-              <a:t>as </a:t>
-            </a:r>
-            <a:r>
-              <a:rPr lang="en-US" sz="1200" dirty="0" err="1">
-                <a:solidFill>
-                  <a:srgbClr val="000000"/>
-                </a:solidFill>
-                <a:latin typeface="Consolas" panose="020B0609020204030204" pitchFamily="49" charset="0"/>
-              </a:rPr>
-              <a:t>numberTracks</a:t>
-            </a:r>
-            <a:r>
-              <a:rPr lang="en-US" sz="1200" dirty="0">
-                <a:solidFill>
-                  <a:srgbClr val="000000"/>
-                </a:solidFill>
-                <a:latin typeface="Consolas" panose="020B0609020204030204" pitchFamily="49" charset="0"/>
-              </a:rPr>
-              <a:t> </a:t>
-            </a:r>
-            <a:r>
-              <a:rPr lang="en-US" sz="1200" dirty="0">
-                <a:solidFill>
-                  <a:srgbClr val="6B8E23"/>
-                </a:solidFill>
-                <a:latin typeface="Consolas" panose="020B0609020204030204" pitchFamily="49" charset="0"/>
-              </a:rPr>
-              <a:t>--&lt;3&gt;</a:t>
-            </a:r>
-          </a:p>
-          <a:p>
-            <a:r>
-              <a:rPr lang="en-US" sz="1200" dirty="0">
-                <a:solidFill>
-                  <a:srgbClr val="0000FF"/>
-                </a:solidFill>
-                <a:latin typeface="Consolas" panose="020B0609020204030204" pitchFamily="49" charset="0"/>
-              </a:rPr>
-              <a:t>from </a:t>
-            </a:r>
-            <a:r>
-              <a:rPr lang="en-US" sz="1200" dirty="0">
-                <a:solidFill>
-                  <a:srgbClr val="000000"/>
-                </a:solidFill>
-                <a:latin typeface="Consolas" panose="020B0609020204030204" pitchFamily="49" charset="0"/>
-              </a:rPr>
-              <a:t>Genre G   </a:t>
-            </a:r>
-          </a:p>
-          <a:p>
-            <a:endParaRPr lang="en-US" sz="1200" dirty="0">
-              <a:solidFill>
-                <a:srgbClr val="000000"/>
-              </a:solidFill>
-              <a:latin typeface="Consolas" panose="020B0609020204030204" pitchFamily="49" charset="0"/>
-            </a:endParaRPr>
-          </a:p>
-          <a:p>
-            <a:r>
-              <a:rPr lang="en-US" b="1" dirty="0">
-                <a:solidFill>
-                  <a:srgbClr val="0000FF"/>
-                </a:solidFill>
-                <a:latin typeface="Consolas" panose="020B0609020204030204" pitchFamily="49" charset="0"/>
-              </a:rPr>
-              <a:t>left</a:t>
-            </a:r>
-            <a:r>
-              <a:rPr lang="en-US" sz="1200" dirty="0">
-                <a:solidFill>
-                  <a:srgbClr val="0000FF"/>
-                </a:solidFill>
-                <a:latin typeface="Consolas" panose="020B0609020204030204" pitchFamily="49" charset="0"/>
-              </a:rPr>
-              <a:t> outer Join </a:t>
-            </a:r>
-            <a:r>
-              <a:rPr lang="en-US" sz="1200" dirty="0">
-                <a:solidFill>
-                  <a:srgbClr val="000000"/>
-                </a:solidFill>
-                <a:latin typeface="Consolas" panose="020B0609020204030204" pitchFamily="49" charset="0"/>
-              </a:rPr>
-              <a:t>Track T  </a:t>
-            </a:r>
-            <a:r>
-              <a:rPr lang="en-US" sz="1200" dirty="0">
-                <a:solidFill>
-                  <a:srgbClr val="6B8E23"/>
-                </a:solidFill>
-                <a:latin typeface="Consolas" panose="020B0609020204030204" pitchFamily="49" charset="0"/>
-              </a:rPr>
-              <a:t>--&lt;6&gt;</a:t>
-            </a:r>
-          </a:p>
-          <a:p>
-            <a:r>
-              <a:rPr lang="nl-NL" sz="1200" dirty="0">
-                <a:solidFill>
-                  <a:srgbClr val="0000FF"/>
-                </a:solidFill>
-                <a:latin typeface="Consolas" panose="020B0609020204030204" pitchFamily="49" charset="0"/>
-              </a:rPr>
-              <a:t>on </a:t>
-            </a:r>
-            <a:r>
-              <a:rPr lang="nl-NL" sz="1200" dirty="0">
-                <a:solidFill>
-                  <a:srgbClr val="000000"/>
-                </a:solidFill>
-                <a:latin typeface="Consolas" panose="020B0609020204030204" pitchFamily="49" charset="0"/>
-              </a:rPr>
-              <a:t>T</a:t>
-            </a:r>
-            <a:r>
-              <a:rPr lang="nl-NL" sz="1200" b="1" dirty="0">
-                <a:solidFill>
-                  <a:srgbClr val="EE9999"/>
-                </a:solidFill>
-                <a:latin typeface="Consolas" panose="020B0609020204030204" pitchFamily="49" charset="0"/>
-              </a:rPr>
-              <a:t>.</a:t>
-            </a:r>
-            <a:r>
-              <a:rPr lang="nl-NL" sz="1200" dirty="0">
-                <a:solidFill>
-                  <a:srgbClr val="000000"/>
-                </a:solidFill>
-                <a:latin typeface="Consolas" panose="020B0609020204030204" pitchFamily="49" charset="0"/>
-              </a:rPr>
-              <a:t>GenreID </a:t>
-            </a:r>
-            <a:r>
-              <a:rPr lang="nl-NL" sz="1200" b="1" dirty="0">
-                <a:solidFill>
-                  <a:srgbClr val="EE9999"/>
-                </a:solidFill>
-                <a:latin typeface="Consolas" panose="020B0609020204030204" pitchFamily="49" charset="0"/>
-              </a:rPr>
-              <a:t>= </a:t>
-            </a:r>
-            <a:r>
-              <a:rPr lang="nl-NL" sz="1200" dirty="0">
-                <a:solidFill>
-                  <a:srgbClr val="000000"/>
-                </a:solidFill>
-                <a:latin typeface="Consolas" panose="020B0609020204030204" pitchFamily="49" charset="0"/>
-              </a:rPr>
-              <a:t>G</a:t>
-            </a:r>
-            <a:r>
-              <a:rPr lang="nl-NL" sz="1200" b="1" dirty="0">
-                <a:solidFill>
-                  <a:srgbClr val="EE9999"/>
-                </a:solidFill>
-                <a:latin typeface="Consolas" panose="020B0609020204030204" pitchFamily="49" charset="0"/>
-              </a:rPr>
-              <a:t>.</a:t>
-            </a:r>
-            <a:r>
-              <a:rPr lang="nl-NL" sz="1200" dirty="0">
-                <a:solidFill>
-                  <a:srgbClr val="000000"/>
-                </a:solidFill>
-                <a:latin typeface="Consolas" panose="020B0609020204030204" pitchFamily="49" charset="0"/>
-              </a:rPr>
-              <a:t>GenreID</a:t>
-            </a:r>
-          </a:p>
-          <a:p>
-            <a:endParaRPr lang="en-US" sz="1200" dirty="0">
-              <a:solidFill>
-                <a:srgbClr val="000000"/>
-              </a:solidFill>
-              <a:latin typeface="Consolas" panose="020B0609020204030204" pitchFamily="49" charset="0"/>
-            </a:endParaRPr>
-          </a:p>
-          <a:p>
-            <a:r>
-              <a:rPr lang="en-US" sz="1200" dirty="0">
-                <a:solidFill>
-                  <a:srgbClr val="0000FF"/>
-                </a:solidFill>
-                <a:latin typeface="Consolas" panose="020B0609020204030204" pitchFamily="49" charset="0"/>
-              </a:rPr>
-              <a:t>Group by</a:t>
-            </a:r>
-          </a:p>
-          <a:p>
-            <a:r>
-              <a:rPr lang="en-US" sz="1200" dirty="0">
-                <a:solidFill>
-                  <a:srgbClr val="0000FF"/>
-                </a:solidFill>
-                <a:latin typeface="Consolas" panose="020B0609020204030204" pitchFamily="49" charset="0"/>
-              </a:rPr>
-              <a:t>	</a:t>
-            </a:r>
-            <a:r>
-              <a:rPr lang="en-US" sz="1200" dirty="0" err="1">
-                <a:solidFill>
-                  <a:srgbClr val="000000"/>
-                </a:solidFill>
-                <a:latin typeface="Consolas" panose="020B0609020204030204" pitchFamily="49" charset="0"/>
-              </a:rPr>
-              <a:t>G</a:t>
-            </a:r>
-            <a:r>
-              <a:rPr lang="en-US" sz="1200" b="1" dirty="0" err="1">
-                <a:solidFill>
-                  <a:srgbClr val="EE9999"/>
-                </a:solidFill>
-                <a:latin typeface="Consolas" panose="020B0609020204030204" pitchFamily="49" charset="0"/>
-              </a:rPr>
-              <a:t>.</a:t>
-            </a:r>
-            <a:r>
-              <a:rPr lang="en-US" sz="1200" dirty="0" err="1">
-                <a:solidFill>
-                  <a:srgbClr val="000000"/>
-                </a:solidFill>
-                <a:latin typeface="Consolas" panose="020B0609020204030204" pitchFamily="49" charset="0"/>
-              </a:rPr>
-              <a:t>GenreID</a:t>
-            </a:r>
-            <a:endParaRPr lang="en-US" sz="1200" dirty="0">
-              <a:solidFill>
-                <a:srgbClr val="000000"/>
-              </a:solidFill>
-              <a:latin typeface="Consolas" panose="020B0609020204030204" pitchFamily="49" charset="0"/>
-            </a:endParaRPr>
-          </a:p>
-          <a:p>
-            <a:r>
-              <a:rPr lang="en-US" sz="1200" dirty="0">
-                <a:solidFill>
-                  <a:srgbClr val="000000"/>
-                </a:solidFill>
-                <a:latin typeface="Consolas" panose="020B0609020204030204" pitchFamily="49" charset="0"/>
-              </a:rPr>
-              <a:t>	</a:t>
-            </a:r>
-            <a:r>
-              <a:rPr lang="en-US" sz="1200" b="1" dirty="0">
-                <a:solidFill>
-                  <a:srgbClr val="EE9999"/>
-                </a:solidFill>
-                <a:latin typeface="Consolas" panose="020B0609020204030204" pitchFamily="49" charset="0"/>
-              </a:rPr>
-              <a:t>,</a:t>
-            </a:r>
-            <a:r>
-              <a:rPr lang="en-US" sz="1200" dirty="0" err="1">
-                <a:solidFill>
-                  <a:srgbClr val="000000"/>
-                </a:solidFill>
-                <a:latin typeface="Consolas" panose="020B0609020204030204" pitchFamily="49" charset="0"/>
-              </a:rPr>
-              <a:t>genreName</a:t>
-            </a:r>
-            <a:r>
-              <a:rPr lang="en-US" sz="1200" dirty="0">
-                <a:solidFill>
-                  <a:srgbClr val="000000"/>
-                </a:solidFill>
-                <a:latin typeface="Consolas" panose="020B0609020204030204" pitchFamily="49" charset="0"/>
-              </a:rPr>
-              <a:t>   </a:t>
-            </a:r>
-            <a:r>
-              <a:rPr lang="en-US" sz="1200" dirty="0">
-                <a:solidFill>
-                  <a:srgbClr val="6B8E23"/>
-                </a:solidFill>
-                <a:latin typeface="Consolas" panose="020B0609020204030204" pitchFamily="49" charset="0"/>
-              </a:rPr>
-              <a:t>--&lt;5&gt;</a:t>
-            </a:r>
-          </a:p>
-          <a:p>
-            <a:r>
-              <a:rPr lang="en-US" sz="1200" dirty="0">
-                <a:solidFill>
-                  <a:srgbClr val="0000FF"/>
-                </a:solidFill>
-                <a:latin typeface="Consolas" panose="020B0609020204030204" pitchFamily="49" charset="0"/>
-              </a:rPr>
-              <a:t>order by </a:t>
-            </a:r>
-          </a:p>
-          <a:p>
-            <a:r>
-              <a:rPr lang="en-US" sz="1200" dirty="0">
-                <a:solidFill>
-                  <a:srgbClr val="0000FF"/>
-                </a:solidFill>
-                <a:latin typeface="Consolas" panose="020B0609020204030204" pitchFamily="49" charset="0"/>
-              </a:rPr>
-              <a:t>	</a:t>
-            </a:r>
-            <a:r>
-              <a:rPr lang="en-US" sz="1200" dirty="0" err="1">
-                <a:solidFill>
-                  <a:srgbClr val="000000"/>
-                </a:solidFill>
-                <a:latin typeface="Consolas" panose="020B0609020204030204" pitchFamily="49" charset="0"/>
-              </a:rPr>
-              <a:t>genreName</a:t>
-            </a:r>
-            <a:r>
-              <a:rPr lang="en-US" sz="1200" dirty="0">
-                <a:solidFill>
-                  <a:srgbClr val="C0C0C0"/>
-                </a:solidFill>
-                <a:latin typeface="Consolas" panose="020B0609020204030204" pitchFamily="49" charset="0"/>
-              </a:rPr>
-              <a:t>;  </a:t>
-            </a:r>
-            <a:r>
-              <a:rPr lang="en-US" sz="1200" dirty="0">
-                <a:solidFill>
-                  <a:srgbClr val="6B8E23"/>
-                </a:solidFill>
-                <a:latin typeface="Consolas" panose="020B0609020204030204" pitchFamily="49" charset="0"/>
-              </a:rPr>
-              <a:t>--&lt;5&gt;		</a:t>
-            </a:r>
-            <a:endParaRPr lang="en-US" sz="3200" dirty="0"/>
           </a:p>
         </p:txBody>
       </p:sp>

</xml_diff>